<commit_message>
Some fixes to the presentation
</commit_message>
<xml_diff>
--- a/Sound Dynamic Deadlock Prediction in Linear Time.pptx
+++ b/Sound Dynamic Deadlock Prediction in Linear Time.pptx
@@ -9,23 +9,31 @@
     <p:sldId id="257" r:id="rId3"/>
     <p:sldId id="259" r:id="rId4"/>
     <p:sldId id="260" r:id="rId5"/>
-    <p:sldId id="261" r:id="rId6"/>
-    <p:sldId id="264" r:id="rId7"/>
-    <p:sldId id="262" r:id="rId8"/>
-    <p:sldId id="266" r:id="rId9"/>
-    <p:sldId id="265" r:id="rId10"/>
-    <p:sldId id="267" r:id="rId11"/>
-    <p:sldId id="263" r:id="rId12"/>
-    <p:sldId id="268" r:id="rId13"/>
-    <p:sldId id="270" r:id="rId14"/>
-    <p:sldId id="271" r:id="rId15"/>
-    <p:sldId id="272" r:id="rId16"/>
-    <p:sldId id="269" r:id="rId17"/>
-    <p:sldId id="275" r:id="rId18"/>
-    <p:sldId id="274" r:id="rId19"/>
-    <p:sldId id="276" r:id="rId20"/>
-    <p:sldId id="277" r:id="rId21"/>
-    <p:sldId id="258" r:id="rId22"/>
+    <p:sldId id="278" r:id="rId6"/>
+    <p:sldId id="261" r:id="rId7"/>
+    <p:sldId id="279" r:id="rId8"/>
+    <p:sldId id="262" r:id="rId9"/>
+    <p:sldId id="266" r:id="rId10"/>
+    <p:sldId id="265" r:id="rId11"/>
+    <p:sldId id="280" r:id="rId12"/>
+    <p:sldId id="281" r:id="rId13"/>
+    <p:sldId id="283" r:id="rId14"/>
+    <p:sldId id="284" r:id="rId15"/>
+    <p:sldId id="285" r:id="rId16"/>
+    <p:sldId id="286" r:id="rId17"/>
+    <p:sldId id="287" r:id="rId18"/>
+    <p:sldId id="267" r:id="rId19"/>
+    <p:sldId id="263" r:id="rId20"/>
+    <p:sldId id="268" r:id="rId21"/>
+    <p:sldId id="270" r:id="rId22"/>
+    <p:sldId id="271" r:id="rId23"/>
+    <p:sldId id="272" r:id="rId24"/>
+    <p:sldId id="269" r:id="rId25"/>
+    <p:sldId id="275" r:id="rId26"/>
+    <p:sldId id="274" r:id="rId27"/>
+    <p:sldId id="276" r:id="rId28"/>
+    <p:sldId id="277" r:id="rId29"/>
+    <p:sldId id="258" r:id="rId30"/>
   </p:sldIdLst>
   <p:sldSz cx="12192000" cy="6858000"/>
   <p:notesSz cx="6858000" cy="9144000"/>
@@ -3440,6 +3448,2798 @@
           <p:cNvPr id="2" name="Titel 1">
             <a:extLst>
               <a:ext uri="{FF2B5EF4-FFF2-40B4-BE49-F238E27FC236}">
+                <a16:creationId xmlns:a16="http://schemas.microsoft.com/office/drawing/2014/main" id="{661FD3D5-05E5-BB98-FE98-EAB9EA7B8B07}"/>
+              </a:ext>
+            </a:extLst>
+          </p:cNvPr>
+          <p:cNvSpPr>
+            <a:spLocks noGrp="1"/>
+          </p:cNvSpPr>
+          <p:nvPr>
+            <p:ph type="title"/>
+          </p:nvPr>
+        </p:nvSpPr>
+        <p:spPr/>
+        <p:txBody>
+          <a:bodyPr/>
+          <a:lstStyle/>
+          <a:p>
+            <a:r>
+              <a:rPr lang="de-DE" dirty="0"/>
+              <a:t>Dynamische Deadlock-Analyse</a:t>
+            </a:r>
+          </a:p>
+        </p:txBody>
+      </p:sp>
+      <p:pic>
+        <p:nvPicPr>
+          <p:cNvPr id="7" name="Grafik 6">
+            <a:extLst>
+              <a:ext uri="{FF2B5EF4-FFF2-40B4-BE49-F238E27FC236}">
+                <a16:creationId xmlns:a16="http://schemas.microsoft.com/office/drawing/2014/main" id="{94018E8F-24AE-2186-5097-F867FBCC1118}"/>
+              </a:ext>
+            </a:extLst>
+          </p:cNvPr>
+          <p:cNvPicPr>
+            <a:picLocks noChangeAspect="1"/>
+          </p:cNvPicPr>
+          <p:nvPr/>
+        </p:nvPicPr>
+        <p:blipFill>
+          <a:blip r:embed="rId2"/>
+          <a:stretch>
+            <a:fillRect/>
+          </a:stretch>
+        </p:blipFill>
+        <p:spPr>
+          <a:xfrm>
+            <a:off x="622085" y="1825625"/>
+            <a:ext cx="4429743" cy="4191585"/>
+          </a:xfrm>
+          <a:prstGeom prst="rect">
+            <a:avLst/>
+          </a:prstGeom>
+          <a:ln>
+            <a:solidFill>
+              <a:schemeClr val="tx1"/>
+            </a:solidFill>
+          </a:ln>
+        </p:spPr>
+      </p:pic>
+      <p:sp>
+        <p:nvSpPr>
+          <p:cNvPr id="8" name="Inhaltsplatzhalter 7">
+            <a:extLst>
+              <a:ext uri="{FF2B5EF4-FFF2-40B4-BE49-F238E27FC236}">
+                <a16:creationId xmlns:a16="http://schemas.microsoft.com/office/drawing/2014/main" id="{2754EA18-5000-3F68-48CA-1F29DF784D3E}"/>
+              </a:ext>
+            </a:extLst>
+          </p:cNvPr>
+          <p:cNvSpPr>
+            <a:spLocks noGrp="1"/>
+          </p:cNvSpPr>
+          <p:nvPr>
+            <p:ph idx="1"/>
+          </p:nvPr>
+        </p:nvSpPr>
+        <p:spPr/>
+        <p:txBody>
+          <a:bodyPr/>
+          <a:lstStyle/>
+          <a:p>
+            <a:endParaRPr lang="de-DE" dirty="0"/>
+          </a:p>
+        </p:txBody>
+      </p:sp>
+      <p:sp>
+        <p:nvSpPr>
+          <p:cNvPr id="9" name="Textfeld 8">
+            <a:extLst>
+              <a:ext uri="{FF2B5EF4-FFF2-40B4-BE49-F238E27FC236}">
+                <a16:creationId xmlns:a16="http://schemas.microsoft.com/office/drawing/2014/main" id="{42F91DDC-9C08-AAF8-F17D-84ACF3C79F2B}"/>
+              </a:ext>
+            </a:extLst>
+          </p:cNvPr>
+          <p:cNvSpPr txBox="1"/>
+          <p:nvPr/>
+        </p:nvSpPr>
+        <p:spPr>
+          <a:xfrm>
+            <a:off x="5261206" y="1825625"/>
+            <a:ext cx="5883215" cy="369332"/>
+          </a:xfrm>
+          <a:prstGeom prst="rect">
+            <a:avLst/>
+          </a:prstGeom>
+          <a:noFill/>
+        </p:spPr>
+        <p:txBody>
+          <a:bodyPr wrap="square" rtlCol="0">
+            <a:spAutoFit/>
+          </a:bodyPr>
+          <a:lstStyle/>
+          <a:p>
+            <a:r>
+              <a:rPr lang="de-DE" dirty="0"/>
+              <a:t>Es gibt die Locks x und y im Trace -&gt; Knoten x und y im Graph</a:t>
+            </a:r>
+          </a:p>
+        </p:txBody>
+      </p:sp>
+      <p:sp>
+        <p:nvSpPr>
+          <p:cNvPr id="10" name="Ellipse 9">
+            <a:extLst>
+              <a:ext uri="{FF2B5EF4-FFF2-40B4-BE49-F238E27FC236}">
+                <a16:creationId xmlns:a16="http://schemas.microsoft.com/office/drawing/2014/main" id="{B3BE2E0C-42FE-471D-A03E-A9B806CC0DB5}"/>
+              </a:ext>
+            </a:extLst>
+          </p:cNvPr>
+          <p:cNvSpPr/>
+          <p:nvPr/>
+        </p:nvSpPr>
+        <p:spPr>
+          <a:xfrm>
+            <a:off x="5897971" y="4494362"/>
+            <a:ext cx="1242203" cy="836762"/>
+          </a:xfrm>
+          <a:prstGeom prst="ellipse">
+            <a:avLst/>
+          </a:prstGeom>
+          <a:solidFill>
+            <a:schemeClr val="bg1"/>
+          </a:solidFill>
+        </p:spPr>
+        <p:style>
+          <a:lnRef idx="2">
+            <a:schemeClr val="accent1">
+              <a:shade val="15000"/>
+            </a:schemeClr>
+          </a:lnRef>
+          <a:fillRef idx="1">
+            <a:schemeClr val="accent1"/>
+          </a:fillRef>
+          <a:effectRef idx="0">
+            <a:schemeClr val="accent1"/>
+          </a:effectRef>
+          <a:fontRef idx="minor">
+            <a:schemeClr val="lt1"/>
+          </a:fontRef>
+        </p:style>
+        <p:txBody>
+          <a:bodyPr rtlCol="0" anchor="ctr"/>
+          <a:lstStyle/>
+          <a:p>
+            <a:pPr algn="ctr"/>
+            <a:r>
+              <a:rPr lang="de-DE" dirty="0">
+                <a:solidFill>
+                  <a:schemeClr val="tx1"/>
+                </a:solidFill>
+              </a:rPr>
+              <a:t>y</a:t>
+            </a:r>
+          </a:p>
+        </p:txBody>
+      </p:sp>
+      <p:sp>
+        <p:nvSpPr>
+          <p:cNvPr id="12" name="Ellipse 11">
+            <a:extLst>
+              <a:ext uri="{FF2B5EF4-FFF2-40B4-BE49-F238E27FC236}">
+                <a16:creationId xmlns:a16="http://schemas.microsoft.com/office/drawing/2014/main" id="{46165CF1-4BB9-0524-3C11-027ACA7D81ED}"/>
+              </a:ext>
+            </a:extLst>
+          </p:cNvPr>
+          <p:cNvSpPr/>
+          <p:nvPr/>
+        </p:nvSpPr>
+        <p:spPr>
+          <a:xfrm>
+            <a:off x="8625885" y="4494362"/>
+            <a:ext cx="1242203" cy="836762"/>
+          </a:xfrm>
+          <a:prstGeom prst="ellipse">
+            <a:avLst/>
+          </a:prstGeom>
+          <a:solidFill>
+            <a:schemeClr val="bg1"/>
+          </a:solidFill>
+        </p:spPr>
+        <p:style>
+          <a:lnRef idx="2">
+            <a:schemeClr val="accent1">
+              <a:shade val="15000"/>
+            </a:schemeClr>
+          </a:lnRef>
+          <a:fillRef idx="1">
+            <a:schemeClr val="accent1"/>
+          </a:fillRef>
+          <a:effectRef idx="0">
+            <a:schemeClr val="accent1"/>
+          </a:effectRef>
+          <a:fontRef idx="minor">
+            <a:schemeClr val="lt1"/>
+          </a:fontRef>
+        </p:style>
+        <p:txBody>
+          <a:bodyPr rtlCol="0" anchor="ctr"/>
+          <a:lstStyle/>
+          <a:p>
+            <a:pPr algn="ctr"/>
+            <a:r>
+              <a:rPr lang="de-DE" dirty="0">
+                <a:solidFill>
+                  <a:schemeClr val="tx1"/>
+                </a:solidFill>
+              </a:rPr>
+              <a:t>x</a:t>
+            </a:r>
+          </a:p>
+        </p:txBody>
+      </p:sp>
+    </p:spTree>
+    <p:extLst>
+      <p:ext uri="{BB962C8B-B14F-4D97-AF65-F5344CB8AC3E}">
+        <p14:creationId xmlns:p14="http://schemas.microsoft.com/office/powerpoint/2010/main" val="3837331834"/>
+      </p:ext>
+    </p:extLst>
+  </p:cSld>
+  <p:clrMapOvr>
+    <a:masterClrMapping/>
+  </p:clrMapOvr>
+</p:sld>
+</file>
+
+<file path=ppt/slides/slide11.xml><?xml version="1.0" encoding="utf-8"?>
+<p:sld xmlns:a="http://schemas.openxmlformats.org/drawingml/2006/main" xmlns:r="http://schemas.openxmlformats.org/officeDocument/2006/relationships" xmlns:p="http://schemas.openxmlformats.org/presentationml/2006/main">
+  <p:cSld>
+    <p:spTree>
+      <p:nvGrpSpPr>
+        <p:cNvPr id="1" name=""/>
+        <p:cNvGrpSpPr/>
+        <p:nvPr/>
+      </p:nvGrpSpPr>
+      <p:grpSpPr>
+        <a:xfrm>
+          <a:off x="0" y="0"/>
+          <a:ext cx="0" cy="0"/>
+          <a:chOff x="0" y="0"/>
+          <a:chExt cx="0" cy="0"/>
+        </a:xfrm>
+      </p:grpSpPr>
+      <p:sp>
+        <p:nvSpPr>
+          <p:cNvPr id="2" name="Titel 1">
+            <a:extLst>
+              <a:ext uri="{FF2B5EF4-FFF2-40B4-BE49-F238E27FC236}">
+                <a16:creationId xmlns:a16="http://schemas.microsoft.com/office/drawing/2014/main" id="{661FD3D5-05E5-BB98-FE98-EAB9EA7B8B07}"/>
+              </a:ext>
+            </a:extLst>
+          </p:cNvPr>
+          <p:cNvSpPr>
+            <a:spLocks noGrp="1"/>
+          </p:cNvSpPr>
+          <p:nvPr>
+            <p:ph type="title"/>
+          </p:nvPr>
+        </p:nvSpPr>
+        <p:spPr/>
+        <p:txBody>
+          <a:bodyPr/>
+          <a:lstStyle/>
+          <a:p>
+            <a:r>
+              <a:rPr lang="de-DE" dirty="0"/>
+              <a:t>Dynamische Deadlock-Analyse</a:t>
+            </a:r>
+          </a:p>
+        </p:txBody>
+      </p:sp>
+      <p:pic>
+        <p:nvPicPr>
+          <p:cNvPr id="7" name="Grafik 6">
+            <a:extLst>
+              <a:ext uri="{FF2B5EF4-FFF2-40B4-BE49-F238E27FC236}">
+                <a16:creationId xmlns:a16="http://schemas.microsoft.com/office/drawing/2014/main" id="{94018E8F-24AE-2186-5097-F867FBCC1118}"/>
+              </a:ext>
+            </a:extLst>
+          </p:cNvPr>
+          <p:cNvPicPr>
+            <a:picLocks noChangeAspect="1"/>
+          </p:cNvPicPr>
+          <p:nvPr/>
+        </p:nvPicPr>
+        <p:blipFill>
+          <a:blip r:embed="rId2"/>
+          <a:stretch>
+            <a:fillRect/>
+          </a:stretch>
+        </p:blipFill>
+        <p:spPr>
+          <a:xfrm>
+            <a:off x="622085" y="1825625"/>
+            <a:ext cx="4429743" cy="4191585"/>
+          </a:xfrm>
+          <a:prstGeom prst="rect">
+            <a:avLst/>
+          </a:prstGeom>
+          <a:ln>
+            <a:solidFill>
+              <a:schemeClr val="tx1"/>
+            </a:solidFill>
+          </a:ln>
+        </p:spPr>
+      </p:pic>
+      <p:sp>
+        <p:nvSpPr>
+          <p:cNvPr id="8" name="Inhaltsplatzhalter 7">
+            <a:extLst>
+              <a:ext uri="{FF2B5EF4-FFF2-40B4-BE49-F238E27FC236}">
+                <a16:creationId xmlns:a16="http://schemas.microsoft.com/office/drawing/2014/main" id="{2754EA18-5000-3F68-48CA-1F29DF784D3E}"/>
+              </a:ext>
+            </a:extLst>
+          </p:cNvPr>
+          <p:cNvSpPr>
+            <a:spLocks noGrp="1"/>
+          </p:cNvSpPr>
+          <p:nvPr>
+            <p:ph idx="1"/>
+          </p:nvPr>
+        </p:nvSpPr>
+        <p:spPr/>
+        <p:txBody>
+          <a:bodyPr/>
+          <a:lstStyle/>
+          <a:p>
+            <a:endParaRPr lang="de-DE" dirty="0"/>
+          </a:p>
+        </p:txBody>
+      </p:sp>
+      <p:sp>
+        <p:nvSpPr>
+          <p:cNvPr id="9" name="Textfeld 8">
+            <a:extLst>
+              <a:ext uri="{FF2B5EF4-FFF2-40B4-BE49-F238E27FC236}">
+                <a16:creationId xmlns:a16="http://schemas.microsoft.com/office/drawing/2014/main" id="{42F91DDC-9C08-AAF8-F17D-84ACF3C79F2B}"/>
+              </a:ext>
+            </a:extLst>
+          </p:cNvPr>
+          <p:cNvSpPr txBox="1"/>
+          <p:nvPr/>
+        </p:nvSpPr>
+        <p:spPr>
+          <a:xfrm>
+            <a:off x="5235327" y="1825625"/>
+            <a:ext cx="5883215" cy="1200329"/>
+          </a:xfrm>
+          <a:prstGeom prst="rect">
+            <a:avLst/>
+          </a:prstGeom>
+          <a:noFill/>
+        </p:spPr>
+        <p:txBody>
+          <a:bodyPr wrap="square" rtlCol="0">
+            <a:spAutoFit/>
+          </a:bodyPr>
+          <a:lstStyle/>
+          <a:p>
+            <a:r>
+              <a:rPr lang="de-DE" dirty="0"/>
+              <a:t>Es gibt die Locks x und y im Trace </a:t>
+            </a:r>
+          </a:p>
+          <a:p>
+            <a:pPr marL="285750" indent="-285750">
+              <a:buFont typeface="Wingdings" panose="05000000000000000000" pitchFamily="2" charset="2"/>
+              <a:buChar char="è"/>
+            </a:pPr>
+            <a:r>
+              <a:rPr lang="de-DE" dirty="0"/>
+              <a:t>Knoten x und y im Graph</a:t>
+            </a:r>
+          </a:p>
+          <a:p>
+            <a:r>
+              <a:rPr lang="de-DE" dirty="0"/>
+              <a:t>In T1 wird nach Lock y Lock x reserviert</a:t>
+            </a:r>
+          </a:p>
+          <a:p>
+            <a:pPr marL="285750" indent="-285750">
+              <a:buFont typeface="Wingdings" panose="05000000000000000000" pitchFamily="2" charset="2"/>
+              <a:buChar char="è"/>
+            </a:pPr>
+            <a:r>
+              <a:rPr lang="de-DE" dirty="0"/>
+              <a:t>Kante von y nach x</a:t>
+            </a:r>
+          </a:p>
+        </p:txBody>
+      </p:sp>
+      <p:sp>
+        <p:nvSpPr>
+          <p:cNvPr id="10" name="Ellipse 9">
+            <a:extLst>
+              <a:ext uri="{FF2B5EF4-FFF2-40B4-BE49-F238E27FC236}">
+                <a16:creationId xmlns:a16="http://schemas.microsoft.com/office/drawing/2014/main" id="{B3BE2E0C-42FE-471D-A03E-A9B806CC0DB5}"/>
+              </a:ext>
+            </a:extLst>
+          </p:cNvPr>
+          <p:cNvSpPr/>
+          <p:nvPr/>
+        </p:nvSpPr>
+        <p:spPr>
+          <a:xfrm>
+            <a:off x="5897971" y="4494362"/>
+            <a:ext cx="1242203" cy="836762"/>
+          </a:xfrm>
+          <a:prstGeom prst="ellipse">
+            <a:avLst/>
+          </a:prstGeom>
+          <a:solidFill>
+            <a:schemeClr val="bg1"/>
+          </a:solidFill>
+        </p:spPr>
+        <p:style>
+          <a:lnRef idx="2">
+            <a:schemeClr val="accent1">
+              <a:shade val="15000"/>
+            </a:schemeClr>
+          </a:lnRef>
+          <a:fillRef idx="1">
+            <a:schemeClr val="accent1"/>
+          </a:fillRef>
+          <a:effectRef idx="0">
+            <a:schemeClr val="accent1"/>
+          </a:effectRef>
+          <a:fontRef idx="minor">
+            <a:schemeClr val="lt1"/>
+          </a:fontRef>
+        </p:style>
+        <p:txBody>
+          <a:bodyPr rtlCol="0" anchor="ctr"/>
+          <a:lstStyle/>
+          <a:p>
+            <a:pPr algn="ctr"/>
+            <a:r>
+              <a:rPr lang="de-DE" dirty="0">
+                <a:solidFill>
+                  <a:schemeClr val="tx1"/>
+                </a:solidFill>
+              </a:rPr>
+              <a:t>y</a:t>
+            </a:r>
+          </a:p>
+        </p:txBody>
+      </p:sp>
+      <p:sp>
+        <p:nvSpPr>
+          <p:cNvPr id="12" name="Ellipse 11">
+            <a:extLst>
+              <a:ext uri="{FF2B5EF4-FFF2-40B4-BE49-F238E27FC236}">
+                <a16:creationId xmlns:a16="http://schemas.microsoft.com/office/drawing/2014/main" id="{46165CF1-4BB9-0524-3C11-027ACA7D81ED}"/>
+              </a:ext>
+            </a:extLst>
+          </p:cNvPr>
+          <p:cNvSpPr/>
+          <p:nvPr/>
+        </p:nvSpPr>
+        <p:spPr>
+          <a:xfrm>
+            <a:off x="8625885" y="4494362"/>
+            <a:ext cx="1242203" cy="836762"/>
+          </a:xfrm>
+          <a:prstGeom prst="ellipse">
+            <a:avLst/>
+          </a:prstGeom>
+          <a:solidFill>
+            <a:schemeClr val="bg1"/>
+          </a:solidFill>
+        </p:spPr>
+        <p:style>
+          <a:lnRef idx="2">
+            <a:schemeClr val="accent1">
+              <a:shade val="15000"/>
+            </a:schemeClr>
+          </a:lnRef>
+          <a:fillRef idx="1">
+            <a:schemeClr val="accent1"/>
+          </a:fillRef>
+          <a:effectRef idx="0">
+            <a:schemeClr val="accent1"/>
+          </a:effectRef>
+          <a:fontRef idx="minor">
+            <a:schemeClr val="lt1"/>
+          </a:fontRef>
+        </p:style>
+        <p:txBody>
+          <a:bodyPr rtlCol="0" anchor="ctr"/>
+          <a:lstStyle/>
+          <a:p>
+            <a:pPr algn="ctr"/>
+            <a:r>
+              <a:rPr lang="de-DE" dirty="0">
+                <a:solidFill>
+                  <a:schemeClr val="tx1"/>
+                </a:solidFill>
+              </a:rPr>
+              <a:t>x</a:t>
+            </a:r>
+          </a:p>
+        </p:txBody>
+      </p:sp>
+      <p:cxnSp>
+        <p:nvCxnSpPr>
+          <p:cNvPr id="11" name="Verbinder: gekrümmt 10">
+            <a:extLst>
+              <a:ext uri="{FF2B5EF4-FFF2-40B4-BE49-F238E27FC236}">
+                <a16:creationId xmlns:a16="http://schemas.microsoft.com/office/drawing/2014/main" id="{F6107784-22A6-267C-4D97-48C309ACE4BD}"/>
+              </a:ext>
+            </a:extLst>
+          </p:cNvPr>
+          <p:cNvCxnSpPr>
+            <a:cxnSpLocks/>
+            <a:stCxn id="10" idx="0"/>
+            <a:endCxn id="12" idx="0"/>
+          </p:cNvCxnSpPr>
+          <p:nvPr/>
+        </p:nvCxnSpPr>
+        <p:spPr>
+          <a:xfrm rot="5400000" flipH="1" flipV="1">
+            <a:off x="7883030" y="3130405"/>
+            <a:ext cx="12700" cy="2727914"/>
+          </a:xfrm>
+          <a:prstGeom prst="curvedConnector3">
+            <a:avLst>
+              <a:gd name="adj1" fmla="val 1800000"/>
+            </a:avLst>
+          </a:prstGeom>
+          <a:ln>
+            <a:tailEnd type="triangle"/>
+          </a:ln>
+        </p:spPr>
+        <p:style>
+          <a:lnRef idx="1">
+            <a:schemeClr val="accent1"/>
+          </a:lnRef>
+          <a:fillRef idx="0">
+            <a:schemeClr val="accent1"/>
+          </a:fillRef>
+          <a:effectRef idx="0">
+            <a:schemeClr val="accent1"/>
+          </a:effectRef>
+          <a:fontRef idx="minor">
+            <a:schemeClr val="tx1"/>
+          </a:fontRef>
+        </p:style>
+      </p:cxnSp>
+    </p:spTree>
+    <p:extLst>
+      <p:ext uri="{BB962C8B-B14F-4D97-AF65-F5344CB8AC3E}">
+        <p14:creationId xmlns:p14="http://schemas.microsoft.com/office/powerpoint/2010/main" val="2284841677"/>
+      </p:ext>
+    </p:extLst>
+  </p:cSld>
+  <p:clrMapOvr>
+    <a:masterClrMapping/>
+  </p:clrMapOvr>
+</p:sld>
+</file>
+
+<file path=ppt/slides/slide12.xml><?xml version="1.0" encoding="utf-8"?>
+<p:sld xmlns:a="http://schemas.openxmlformats.org/drawingml/2006/main" xmlns:r="http://schemas.openxmlformats.org/officeDocument/2006/relationships" xmlns:p="http://schemas.openxmlformats.org/presentationml/2006/main">
+  <p:cSld>
+    <p:spTree>
+      <p:nvGrpSpPr>
+        <p:cNvPr id="1" name=""/>
+        <p:cNvGrpSpPr/>
+        <p:nvPr/>
+      </p:nvGrpSpPr>
+      <p:grpSpPr>
+        <a:xfrm>
+          <a:off x="0" y="0"/>
+          <a:ext cx="0" cy="0"/>
+          <a:chOff x="0" y="0"/>
+          <a:chExt cx="0" cy="0"/>
+        </a:xfrm>
+      </p:grpSpPr>
+      <p:sp>
+        <p:nvSpPr>
+          <p:cNvPr id="2" name="Titel 1">
+            <a:extLst>
+              <a:ext uri="{FF2B5EF4-FFF2-40B4-BE49-F238E27FC236}">
+                <a16:creationId xmlns:a16="http://schemas.microsoft.com/office/drawing/2014/main" id="{661FD3D5-05E5-BB98-FE98-EAB9EA7B8B07}"/>
+              </a:ext>
+            </a:extLst>
+          </p:cNvPr>
+          <p:cNvSpPr>
+            <a:spLocks noGrp="1"/>
+          </p:cNvSpPr>
+          <p:nvPr>
+            <p:ph type="title"/>
+          </p:nvPr>
+        </p:nvSpPr>
+        <p:spPr/>
+        <p:txBody>
+          <a:bodyPr/>
+          <a:lstStyle/>
+          <a:p>
+            <a:r>
+              <a:rPr lang="de-DE" dirty="0"/>
+              <a:t>Dynamische Deadlock-Analyse</a:t>
+            </a:r>
+          </a:p>
+        </p:txBody>
+      </p:sp>
+      <p:pic>
+        <p:nvPicPr>
+          <p:cNvPr id="7" name="Grafik 6">
+            <a:extLst>
+              <a:ext uri="{FF2B5EF4-FFF2-40B4-BE49-F238E27FC236}">
+                <a16:creationId xmlns:a16="http://schemas.microsoft.com/office/drawing/2014/main" id="{94018E8F-24AE-2186-5097-F867FBCC1118}"/>
+              </a:ext>
+            </a:extLst>
+          </p:cNvPr>
+          <p:cNvPicPr>
+            <a:picLocks noChangeAspect="1"/>
+          </p:cNvPicPr>
+          <p:nvPr/>
+        </p:nvPicPr>
+        <p:blipFill>
+          <a:blip r:embed="rId2"/>
+          <a:stretch>
+            <a:fillRect/>
+          </a:stretch>
+        </p:blipFill>
+        <p:spPr>
+          <a:xfrm>
+            <a:off x="622085" y="1825625"/>
+            <a:ext cx="4429743" cy="4191585"/>
+          </a:xfrm>
+          <a:prstGeom prst="rect">
+            <a:avLst/>
+          </a:prstGeom>
+          <a:ln>
+            <a:solidFill>
+              <a:schemeClr val="tx1"/>
+            </a:solidFill>
+          </a:ln>
+        </p:spPr>
+      </p:pic>
+      <p:sp>
+        <p:nvSpPr>
+          <p:cNvPr id="8" name="Inhaltsplatzhalter 7">
+            <a:extLst>
+              <a:ext uri="{FF2B5EF4-FFF2-40B4-BE49-F238E27FC236}">
+                <a16:creationId xmlns:a16="http://schemas.microsoft.com/office/drawing/2014/main" id="{2754EA18-5000-3F68-48CA-1F29DF784D3E}"/>
+              </a:ext>
+            </a:extLst>
+          </p:cNvPr>
+          <p:cNvSpPr>
+            <a:spLocks noGrp="1"/>
+          </p:cNvSpPr>
+          <p:nvPr>
+            <p:ph idx="1"/>
+          </p:nvPr>
+        </p:nvSpPr>
+        <p:spPr/>
+        <p:txBody>
+          <a:bodyPr/>
+          <a:lstStyle/>
+          <a:p>
+            <a:endParaRPr lang="de-DE" dirty="0"/>
+          </a:p>
+        </p:txBody>
+      </p:sp>
+      <p:sp>
+        <p:nvSpPr>
+          <p:cNvPr id="9" name="Textfeld 8">
+            <a:extLst>
+              <a:ext uri="{FF2B5EF4-FFF2-40B4-BE49-F238E27FC236}">
+                <a16:creationId xmlns:a16="http://schemas.microsoft.com/office/drawing/2014/main" id="{42F91DDC-9C08-AAF8-F17D-84ACF3C79F2B}"/>
+              </a:ext>
+            </a:extLst>
+          </p:cNvPr>
+          <p:cNvSpPr txBox="1"/>
+          <p:nvPr/>
+        </p:nvSpPr>
+        <p:spPr>
+          <a:xfrm>
+            <a:off x="5235327" y="1825625"/>
+            <a:ext cx="5883215" cy="1754326"/>
+          </a:xfrm>
+          <a:prstGeom prst="rect">
+            <a:avLst/>
+          </a:prstGeom>
+          <a:noFill/>
+        </p:spPr>
+        <p:txBody>
+          <a:bodyPr wrap="square" rtlCol="0">
+            <a:spAutoFit/>
+          </a:bodyPr>
+          <a:lstStyle/>
+          <a:p>
+            <a:r>
+              <a:rPr lang="de-DE" dirty="0"/>
+              <a:t>Es gibt die Locks x und y im Trace </a:t>
+            </a:r>
+          </a:p>
+          <a:p>
+            <a:pPr marL="285750" indent="-285750">
+              <a:buFont typeface="Wingdings" panose="05000000000000000000" pitchFamily="2" charset="2"/>
+              <a:buChar char="è"/>
+            </a:pPr>
+            <a:r>
+              <a:rPr lang="de-DE" dirty="0"/>
+              <a:t>Knoten x und y im Graph</a:t>
+            </a:r>
+          </a:p>
+          <a:p>
+            <a:r>
+              <a:rPr lang="de-DE" dirty="0"/>
+              <a:t>In T1 wird nach Lock y Lock x reserviert</a:t>
+            </a:r>
+          </a:p>
+          <a:p>
+            <a:pPr marL="285750" indent="-285750">
+              <a:buFont typeface="Wingdings" panose="05000000000000000000" pitchFamily="2" charset="2"/>
+              <a:buChar char="è"/>
+            </a:pPr>
+            <a:r>
+              <a:rPr lang="de-DE" dirty="0"/>
+              <a:t>Kante von y nach x</a:t>
+            </a:r>
+          </a:p>
+          <a:p>
+            <a:r>
+              <a:rPr lang="de-DE" dirty="0"/>
+              <a:t>In T2 wird nach Lock x Lock y reserviert</a:t>
+            </a:r>
+          </a:p>
+          <a:p>
+            <a:pPr marL="285750" indent="-285750">
+              <a:buFont typeface="Wingdings" panose="05000000000000000000" pitchFamily="2" charset="2"/>
+              <a:buChar char="è"/>
+            </a:pPr>
+            <a:r>
+              <a:rPr lang="de-DE" dirty="0"/>
+              <a:t>Kante von x nach y</a:t>
+            </a:r>
+          </a:p>
+        </p:txBody>
+      </p:sp>
+      <p:sp>
+        <p:nvSpPr>
+          <p:cNvPr id="10" name="Ellipse 9">
+            <a:extLst>
+              <a:ext uri="{FF2B5EF4-FFF2-40B4-BE49-F238E27FC236}">
+                <a16:creationId xmlns:a16="http://schemas.microsoft.com/office/drawing/2014/main" id="{B3BE2E0C-42FE-471D-A03E-A9B806CC0DB5}"/>
+              </a:ext>
+            </a:extLst>
+          </p:cNvPr>
+          <p:cNvSpPr/>
+          <p:nvPr/>
+        </p:nvSpPr>
+        <p:spPr>
+          <a:xfrm>
+            <a:off x="5897971" y="4494362"/>
+            <a:ext cx="1242203" cy="836762"/>
+          </a:xfrm>
+          <a:prstGeom prst="ellipse">
+            <a:avLst/>
+          </a:prstGeom>
+          <a:solidFill>
+            <a:schemeClr val="bg1"/>
+          </a:solidFill>
+        </p:spPr>
+        <p:style>
+          <a:lnRef idx="2">
+            <a:schemeClr val="accent1">
+              <a:shade val="15000"/>
+            </a:schemeClr>
+          </a:lnRef>
+          <a:fillRef idx="1">
+            <a:schemeClr val="accent1"/>
+          </a:fillRef>
+          <a:effectRef idx="0">
+            <a:schemeClr val="accent1"/>
+          </a:effectRef>
+          <a:fontRef idx="minor">
+            <a:schemeClr val="lt1"/>
+          </a:fontRef>
+        </p:style>
+        <p:txBody>
+          <a:bodyPr rtlCol="0" anchor="ctr"/>
+          <a:lstStyle/>
+          <a:p>
+            <a:pPr algn="ctr"/>
+            <a:r>
+              <a:rPr lang="de-DE" dirty="0">
+                <a:solidFill>
+                  <a:schemeClr val="tx1"/>
+                </a:solidFill>
+              </a:rPr>
+              <a:t>y</a:t>
+            </a:r>
+          </a:p>
+        </p:txBody>
+      </p:sp>
+      <p:sp>
+        <p:nvSpPr>
+          <p:cNvPr id="12" name="Ellipse 11">
+            <a:extLst>
+              <a:ext uri="{FF2B5EF4-FFF2-40B4-BE49-F238E27FC236}">
+                <a16:creationId xmlns:a16="http://schemas.microsoft.com/office/drawing/2014/main" id="{46165CF1-4BB9-0524-3C11-027ACA7D81ED}"/>
+              </a:ext>
+            </a:extLst>
+          </p:cNvPr>
+          <p:cNvSpPr/>
+          <p:nvPr/>
+        </p:nvSpPr>
+        <p:spPr>
+          <a:xfrm>
+            <a:off x="8625885" y="4494362"/>
+            <a:ext cx="1242203" cy="836762"/>
+          </a:xfrm>
+          <a:prstGeom prst="ellipse">
+            <a:avLst/>
+          </a:prstGeom>
+          <a:solidFill>
+            <a:schemeClr val="bg1"/>
+          </a:solidFill>
+        </p:spPr>
+        <p:style>
+          <a:lnRef idx="2">
+            <a:schemeClr val="accent1">
+              <a:shade val="15000"/>
+            </a:schemeClr>
+          </a:lnRef>
+          <a:fillRef idx="1">
+            <a:schemeClr val="accent1"/>
+          </a:fillRef>
+          <a:effectRef idx="0">
+            <a:schemeClr val="accent1"/>
+          </a:effectRef>
+          <a:fontRef idx="minor">
+            <a:schemeClr val="lt1"/>
+          </a:fontRef>
+        </p:style>
+        <p:txBody>
+          <a:bodyPr rtlCol="0" anchor="ctr"/>
+          <a:lstStyle/>
+          <a:p>
+            <a:pPr algn="ctr"/>
+            <a:r>
+              <a:rPr lang="de-DE" dirty="0">
+                <a:solidFill>
+                  <a:schemeClr val="tx1"/>
+                </a:solidFill>
+              </a:rPr>
+              <a:t>x</a:t>
+            </a:r>
+          </a:p>
+        </p:txBody>
+      </p:sp>
+      <p:cxnSp>
+        <p:nvCxnSpPr>
+          <p:cNvPr id="11" name="Verbinder: gekrümmt 10">
+            <a:extLst>
+              <a:ext uri="{FF2B5EF4-FFF2-40B4-BE49-F238E27FC236}">
+                <a16:creationId xmlns:a16="http://schemas.microsoft.com/office/drawing/2014/main" id="{F6107784-22A6-267C-4D97-48C309ACE4BD}"/>
+              </a:ext>
+            </a:extLst>
+          </p:cNvPr>
+          <p:cNvCxnSpPr>
+            <a:cxnSpLocks/>
+            <a:stCxn id="10" idx="0"/>
+            <a:endCxn id="12" idx="0"/>
+          </p:cNvCxnSpPr>
+          <p:nvPr/>
+        </p:nvCxnSpPr>
+        <p:spPr>
+          <a:xfrm rot="5400000" flipH="1" flipV="1">
+            <a:off x="7883030" y="3130405"/>
+            <a:ext cx="12700" cy="2727914"/>
+          </a:xfrm>
+          <a:prstGeom prst="curvedConnector3">
+            <a:avLst>
+              <a:gd name="adj1" fmla="val 1800000"/>
+            </a:avLst>
+          </a:prstGeom>
+          <a:ln>
+            <a:tailEnd type="triangle"/>
+          </a:ln>
+        </p:spPr>
+        <p:style>
+          <a:lnRef idx="1">
+            <a:schemeClr val="accent1"/>
+          </a:lnRef>
+          <a:fillRef idx="0">
+            <a:schemeClr val="accent1"/>
+          </a:fillRef>
+          <a:effectRef idx="0">
+            <a:schemeClr val="accent1"/>
+          </a:effectRef>
+          <a:fontRef idx="minor">
+            <a:schemeClr val="tx1"/>
+          </a:fontRef>
+        </p:style>
+      </p:cxnSp>
+      <p:cxnSp>
+        <p:nvCxnSpPr>
+          <p:cNvPr id="4" name="Verbinder: gekrümmt 3">
+            <a:extLst>
+              <a:ext uri="{FF2B5EF4-FFF2-40B4-BE49-F238E27FC236}">
+                <a16:creationId xmlns:a16="http://schemas.microsoft.com/office/drawing/2014/main" id="{D798DAC8-06C6-9DFB-3D6D-8409FD892265}"/>
+              </a:ext>
+            </a:extLst>
+          </p:cNvPr>
+          <p:cNvCxnSpPr>
+            <a:cxnSpLocks/>
+            <a:stCxn id="12" idx="4"/>
+            <a:endCxn id="10" idx="4"/>
+          </p:cNvCxnSpPr>
+          <p:nvPr/>
+        </p:nvCxnSpPr>
+        <p:spPr>
+          <a:xfrm rot="5400000">
+            <a:off x="7883030" y="3967167"/>
+            <a:ext cx="12700" cy="2727914"/>
+          </a:xfrm>
+          <a:prstGeom prst="curvedConnector3">
+            <a:avLst>
+              <a:gd name="adj1" fmla="val 1800000"/>
+            </a:avLst>
+          </a:prstGeom>
+          <a:ln>
+            <a:tailEnd type="triangle"/>
+          </a:ln>
+        </p:spPr>
+        <p:style>
+          <a:lnRef idx="1">
+            <a:schemeClr val="accent1"/>
+          </a:lnRef>
+          <a:fillRef idx="0">
+            <a:schemeClr val="accent1"/>
+          </a:fillRef>
+          <a:effectRef idx="0">
+            <a:schemeClr val="accent1"/>
+          </a:effectRef>
+          <a:fontRef idx="minor">
+            <a:schemeClr val="tx1"/>
+          </a:fontRef>
+        </p:style>
+      </p:cxnSp>
+    </p:spTree>
+    <p:extLst>
+      <p:ext uri="{BB962C8B-B14F-4D97-AF65-F5344CB8AC3E}">
+        <p14:creationId xmlns:p14="http://schemas.microsoft.com/office/powerpoint/2010/main" val="3261354223"/>
+      </p:ext>
+    </p:extLst>
+  </p:cSld>
+  <p:clrMapOvr>
+    <a:masterClrMapping/>
+  </p:clrMapOvr>
+</p:sld>
+</file>
+
+<file path=ppt/slides/slide13.xml><?xml version="1.0" encoding="utf-8"?>
+<p:sld xmlns:a="http://schemas.openxmlformats.org/drawingml/2006/main" xmlns:r="http://schemas.openxmlformats.org/officeDocument/2006/relationships" xmlns:p="http://schemas.openxmlformats.org/presentationml/2006/main">
+  <p:cSld>
+    <p:spTree>
+      <p:nvGrpSpPr>
+        <p:cNvPr id="1" name=""/>
+        <p:cNvGrpSpPr/>
+        <p:nvPr/>
+      </p:nvGrpSpPr>
+      <p:grpSpPr>
+        <a:xfrm>
+          <a:off x="0" y="0"/>
+          <a:ext cx="0" cy="0"/>
+          <a:chOff x="0" y="0"/>
+          <a:chExt cx="0" cy="0"/>
+        </a:xfrm>
+      </p:grpSpPr>
+      <p:sp>
+        <p:nvSpPr>
+          <p:cNvPr id="2" name="Titel 1">
+            <a:extLst>
+              <a:ext uri="{FF2B5EF4-FFF2-40B4-BE49-F238E27FC236}">
+                <a16:creationId xmlns:a16="http://schemas.microsoft.com/office/drawing/2014/main" id="{661FD3D5-05E5-BB98-FE98-EAB9EA7B8B07}"/>
+              </a:ext>
+            </a:extLst>
+          </p:cNvPr>
+          <p:cNvSpPr>
+            <a:spLocks noGrp="1"/>
+          </p:cNvSpPr>
+          <p:nvPr>
+            <p:ph type="title"/>
+          </p:nvPr>
+        </p:nvSpPr>
+        <p:spPr/>
+        <p:txBody>
+          <a:bodyPr/>
+          <a:lstStyle/>
+          <a:p>
+            <a:r>
+              <a:rPr lang="de-DE" dirty="0"/>
+              <a:t>Dynamische Deadlock-Analyse</a:t>
+            </a:r>
+          </a:p>
+        </p:txBody>
+      </p:sp>
+      <p:pic>
+        <p:nvPicPr>
+          <p:cNvPr id="7" name="Grafik 6">
+            <a:extLst>
+              <a:ext uri="{FF2B5EF4-FFF2-40B4-BE49-F238E27FC236}">
+                <a16:creationId xmlns:a16="http://schemas.microsoft.com/office/drawing/2014/main" id="{94018E8F-24AE-2186-5097-F867FBCC1118}"/>
+              </a:ext>
+            </a:extLst>
+          </p:cNvPr>
+          <p:cNvPicPr>
+            <a:picLocks noChangeAspect="1"/>
+          </p:cNvPicPr>
+          <p:nvPr/>
+        </p:nvPicPr>
+        <p:blipFill>
+          <a:blip r:embed="rId2"/>
+          <a:stretch>
+            <a:fillRect/>
+          </a:stretch>
+        </p:blipFill>
+        <p:spPr>
+          <a:xfrm>
+            <a:off x="622085" y="1825625"/>
+            <a:ext cx="4429743" cy="4191585"/>
+          </a:xfrm>
+          <a:prstGeom prst="rect">
+            <a:avLst/>
+          </a:prstGeom>
+          <a:ln>
+            <a:solidFill>
+              <a:schemeClr val="tx1"/>
+            </a:solidFill>
+          </a:ln>
+        </p:spPr>
+      </p:pic>
+      <p:sp>
+        <p:nvSpPr>
+          <p:cNvPr id="8" name="Inhaltsplatzhalter 7">
+            <a:extLst>
+              <a:ext uri="{FF2B5EF4-FFF2-40B4-BE49-F238E27FC236}">
+                <a16:creationId xmlns:a16="http://schemas.microsoft.com/office/drawing/2014/main" id="{2754EA18-5000-3F68-48CA-1F29DF784D3E}"/>
+              </a:ext>
+            </a:extLst>
+          </p:cNvPr>
+          <p:cNvSpPr>
+            <a:spLocks noGrp="1"/>
+          </p:cNvSpPr>
+          <p:nvPr>
+            <p:ph idx="1"/>
+          </p:nvPr>
+        </p:nvSpPr>
+        <p:spPr/>
+        <p:txBody>
+          <a:bodyPr/>
+          <a:lstStyle/>
+          <a:p>
+            <a:endParaRPr lang="de-DE" dirty="0"/>
+          </a:p>
+        </p:txBody>
+      </p:sp>
+      <p:sp>
+        <p:nvSpPr>
+          <p:cNvPr id="9" name="Textfeld 8">
+            <a:extLst>
+              <a:ext uri="{FF2B5EF4-FFF2-40B4-BE49-F238E27FC236}">
+                <a16:creationId xmlns:a16="http://schemas.microsoft.com/office/drawing/2014/main" id="{42F91DDC-9C08-AAF8-F17D-84ACF3C79F2B}"/>
+              </a:ext>
+            </a:extLst>
+          </p:cNvPr>
+          <p:cNvSpPr txBox="1"/>
+          <p:nvPr/>
+        </p:nvSpPr>
+        <p:spPr>
+          <a:xfrm>
+            <a:off x="5235327" y="1825625"/>
+            <a:ext cx="5883215" cy="1754326"/>
+          </a:xfrm>
+          <a:prstGeom prst="rect">
+            <a:avLst/>
+          </a:prstGeom>
+          <a:noFill/>
+        </p:spPr>
+        <p:txBody>
+          <a:bodyPr wrap="square" rtlCol="0">
+            <a:spAutoFit/>
+          </a:bodyPr>
+          <a:lstStyle/>
+          <a:p>
+            <a:r>
+              <a:rPr lang="de-DE" dirty="0"/>
+              <a:t>Es gibt die Locks x und y im Trace </a:t>
+            </a:r>
+          </a:p>
+          <a:p>
+            <a:pPr marL="285750" indent="-285750">
+              <a:buFont typeface="Wingdings" panose="05000000000000000000" pitchFamily="2" charset="2"/>
+              <a:buChar char="è"/>
+            </a:pPr>
+            <a:r>
+              <a:rPr lang="de-DE" dirty="0"/>
+              <a:t>Knoten x und y im Graph</a:t>
+            </a:r>
+          </a:p>
+          <a:p>
+            <a:r>
+              <a:rPr lang="de-DE" dirty="0"/>
+              <a:t>In T1 wird nach Lock y Lock x reserviert</a:t>
+            </a:r>
+          </a:p>
+          <a:p>
+            <a:pPr marL="285750" indent="-285750">
+              <a:buFont typeface="Wingdings" panose="05000000000000000000" pitchFamily="2" charset="2"/>
+              <a:buChar char="è"/>
+            </a:pPr>
+            <a:r>
+              <a:rPr lang="de-DE" dirty="0"/>
+              <a:t>Kante von y nach x</a:t>
+            </a:r>
+          </a:p>
+          <a:p>
+            <a:r>
+              <a:rPr lang="de-DE" dirty="0"/>
+              <a:t>In T2 wird nach Lock x Lock y reserviert</a:t>
+            </a:r>
+          </a:p>
+          <a:p>
+            <a:pPr marL="285750" indent="-285750">
+              <a:buFont typeface="Wingdings" panose="05000000000000000000" pitchFamily="2" charset="2"/>
+              <a:buChar char="è"/>
+            </a:pPr>
+            <a:r>
+              <a:rPr lang="de-DE" dirty="0"/>
+              <a:t>Kante von x nach y</a:t>
+            </a:r>
+          </a:p>
+        </p:txBody>
+      </p:sp>
+      <p:sp>
+        <p:nvSpPr>
+          <p:cNvPr id="10" name="Ellipse 9">
+            <a:extLst>
+              <a:ext uri="{FF2B5EF4-FFF2-40B4-BE49-F238E27FC236}">
+                <a16:creationId xmlns:a16="http://schemas.microsoft.com/office/drawing/2014/main" id="{B3BE2E0C-42FE-471D-A03E-A9B806CC0DB5}"/>
+              </a:ext>
+            </a:extLst>
+          </p:cNvPr>
+          <p:cNvSpPr/>
+          <p:nvPr/>
+        </p:nvSpPr>
+        <p:spPr>
+          <a:xfrm>
+            <a:off x="5897971" y="4494362"/>
+            <a:ext cx="1242203" cy="836762"/>
+          </a:xfrm>
+          <a:prstGeom prst="ellipse">
+            <a:avLst/>
+          </a:prstGeom>
+          <a:solidFill>
+            <a:schemeClr val="bg1"/>
+          </a:solidFill>
+        </p:spPr>
+        <p:style>
+          <a:lnRef idx="2">
+            <a:schemeClr val="accent1">
+              <a:shade val="15000"/>
+            </a:schemeClr>
+          </a:lnRef>
+          <a:fillRef idx="1">
+            <a:schemeClr val="accent1"/>
+          </a:fillRef>
+          <a:effectRef idx="0">
+            <a:schemeClr val="accent1"/>
+          </a:effectRef>
+          <a:fontRef idx="minor">
+            <a:schemeClr val="lt1"/>
+          </a:fontRef>
+        </p:style>
+        <p:txBody>
+          <a:bodyPr rtlCol="0" anchor="ctr"/>
+          <a:lstStyle/>
+          <a:p>
+            <a:pPr algn="ctr"/>
+            <a:r>
+              <a:rPr lang="de-DE" dirty="0">
+                <a:solidFill>
+                  <a:schemeClr val="tx1"/>
+                </a:solidFill>
+              </a:rPr>
+              <a:t>y</a:t>
+            </a:r>
+          </a:p>
+        </p:txBody>
+      </p:sp>
+      <p:sp>
+        <p:nvSpPr>
+          <p:cNvPr id="12" name="Ellipse 11">
+            <a:extLst>
+              <a:ext uri="{FF2B5EF4-FFF2-40B4-BE49-F238E27FC236}">
+                <a16:creationId xmlns:a16="http://schemas.microsoft.com/office/drawing/2014/main" id="{46165CF1-4BB9-0524-3C11-027ACA7D81ED}"/>
+              </a:ext>
+            </a:extLst>
+          </p:cNvPr>
+          <p:cNvSpPr/>
+          <p:nvPr/>
+        </p:nvSpPr>
+        <p:spPr>
+          <a:xfrm>
+            <a:off x="8625885" y="4494362"/>
+            <a:ext cx="1242203" cy="836762"/>
+          </a:xfrm>
+          <a:prstGeom prst="ellipse">
+            <a:avLst/>
+          </a:prstGeom>
+          <a:solidFill>
+            <a:schemeClr val="bg1"/>
+          </a:solidFill>
+        </p:spPr>
+        <p:style>
+          <a:lnRef idx="2">
+            <a:schemeClr val="accent1">
+              <a:shade val="15000"/>
+            </a:schemeClr>
+          </a:lnRef>
+          <a:fillRef idx="1">
+            <a:schemeClr val="accent1"/>
+          </a:fillRef>
+          <a:effectRef idx="0">
+            <a:schemeClr val="accent1"/>
+          </a:effectRef>
+          <a:fontRef idx="minor">
+            <a:schemeClr val="lt1"/>
+          </a:fontRef>
+        </p:style>
+        <p:txBody>
+          <a:bodyPr rtlCol="0" anchor="ctr"/>
+          <a:lstStyle/>
+          <a:p>
+            <a:pPr algn="ctr"/>
+            <a:r>
+              <a:rPr lang="de-DE" dirty="0">
+                <a:solidFill>
+                  <a:schemeClr val="tx1"/>
+                </a:solidFill>
+              </a:rPr>
+              <a:t>x</a:t>
+            </a:r>
+          </a:p>
+        </p:txBody>
+      </p:sp>
+      <p:cxnSp>
+        <p:nvCxnSpPr>
+          <p:cNvPr id="11" name="Verbinder: gekrümmt 10">
+            <a:extLst>
+              <a:ext uri="{FF2B5EF4-FFF2-40B4-BE49-F238E27FC236}">
+                <a16:creationId xmlns:a16="http://schemas.microsoft.com/office/drawing/2014/main" id="{F6107784-22A6-267C-4D97-48C309ACE4BD}"/>
+              </a:ext>
+            </a:extLst>
+          </p:cNvPr>
+          <p:cNvCxnSpPr>
+            <a:cxnSpLocks/>
+            <a:stCxn id="10" idx="0"/>
+            <a:endCxn id="12" idx="0"/>
+          </p:cNvCxnSpPr>
+          <p:nvPr/>
+        </p:nvCxnSpPr>
+        <p:spPr>
+          <a:xfrm rot="5400000" flipH="1" flipV="1">
+            <a:off x="7883030" y="3130405"/>
+            <a:ext cx="12700" cy="2727914"/>
+          </a:xfrm>
+          <a:prstGeom prst="curvedConnector3">
+            <a:avLst>
+              <a:gd name="adj1" fmla="val 1800000"/>
+            </a:avLst>
+          </a:prstGeom>
+          <a:ln>
+            <a:tailEnd type="triangle"/>
+          </a:ln>
+        </p:spPr>
+        <p:style>
+          <a:lnRef idx="1">
+            <a:schemeClr val="accent1"/>
+          </a:lnRef>
+          <a:fillRef idx="0">
+            <a:schemeClr val="accent1"/>
+          </a:fillRef>
+          <a:effectRef idx="0">
+            <a:schemeClr val="accent1"/>
+          </a:effectRef>
+          <a:fontRef idx="minor">
+            <a:schemeClr val="tx1"/>
+          </a:fontRef>
+        </p:style>
+      </p:cxnSp>
+      <p:cxnSp>
+        <p:nvCxnSpPr>
+          <p:cNvPr id="4" name="Verbinder: gekrümmt 3">
+            <a:extLst>
+              <a:ext uri="{FF2B5EF4-FFF2-40B4-BE49-F238E27FC236}">
+                <a16:creationId xmlns:a16="http://schemas.microsoft.com/office/drawing/2014/main" id="{D798DAC8-06C6-9DFB-3D6D-8409FD892265}"/>
+              </a:ext>
+            </a:extLst>
+          </p:cNvPr>
+          <p:cNvCxnSpPr>
+            <a:cxnSpLocks/>
+            <a:stCxn id="12" idx="4"/>
+            <a:endCxn id="10" idx="4"/>
+          </p:cNvCxnSpPr>
+          <p:nvPr/>
+        </p:nvCxnSpPr>
+        <p:spPr>
+          <a:xfrm rot="5400000">
+            <a:off x="7883030" y="3967167"/>
+            <a:ext cx="12700" cy="2727914"/>
+          </a:xfrm>
+          <a:prstGeom prst="curvedConnector3">
+            <a:avLst>
+              <a:gd name="adj1" fmla="val 1800000"/>
+            </a:avLst>
+          </a:prstGeom>
+          <a:ln>
+            <a:tailEnd type="triangle"/>
+          </a:ln>
+        </p:spPr>
+        <p:style>
+          <a:lnRef idx="1">
+            <a:schemeClr val="accent1"/>
+          </a:lnRef>
+          <a:fillRef idx="0">
+            <a:schemeClr val="accent1"/>
+          </a:fillRef>
+          <a:effectRef idx="0">
+            <a:schemeClr val="accent1"/>
+          </a:effectRef>
+          <a:fontRef idx="minor">
+            <a:schemeClr val="tx1"/>
+          </a:fontRef>
+        </p:style>
+      </p:cxnSp>
+      <p:sp>
+        <p:nvSpPr>
+          <p:cNvPr id="3" name="Textfeld 2">
+            <a:extLst>
+              <a:ext uri="{FF2B5EF4-FFF2-40B4-BE49-F238E27FC236}">
+                <a16:creationId xmlns:a16="http://schemas.microsoft.com/office/drawing/2014/main" id="{A9E5FF29-7EE1-7012-C938-0423A8BDADEF}"/>
+              </a:ext>
+            </a:extLst>
+          </p:cNvPr>
+          <p:cNvSpPr txBox="1"/>
+          <p:nvPr/>
+        </p:nvSpPr>
+        <p:spPr>
+          <a:xfrm>
+            <a:off x="5235327" y="5555411"/>
+            <a:ext cx="5306152" cy="646331"/>
+          </a:xfrm>
+          <a:prstGeom prst="rect">
+            <a:avLst/>
+          </a:prstGeom>
+          <a:noFill/>
+        </p:spPr>
+        <p:txBody>
+          <a:bodyPr wrap="square" rtlCol="0">
+            <a:spAutoFit/>
+          </a:bodyPr>
+          <a:lstStyle/>
+          <a:p>
+            <a:pPr marL="285750" indent="-285750">
+              <a:buFont typeface="Wingdings" panose="05000000000000000000" pitchFamily="2" charset="2"/>
+              <a:buChar char="è"/>
+            </a:pPr>
+            <a:r>
+              <a:rPr lang="de-DE" dirty="0"/>
+              <a:t>Der resultierende Graph enthält einen Zyklus, also wird ein Deadlock vorhergesagt.</a:t>
+            </a:r>
+          </a:p>
+        </p:txBody>
+      </p:sp>
+    </p:spTree>
+    <p:extLst>
+      <p:ext uri="{BB962C8B-B14F-4D97-AF65-F5344CB8AC3E}">
+        <p14:creationId xmlns:p14="http://schemas.microsoft.com/office/powerpoint/2010/main" val="1291719700"/>
+      </p:ext>
+    </p:extLst>
+  </p:cSld>
+  <p:clrMapOvr>
+    <a:masterClrMapping/>
+  </p:clrMapOvr>
+</p:sld>
+</file>
+
+<file path=ppt/slides/slide14.xml><?xml version="1.0" encoding="utf-8"?>
+<p:sld xmlns:a="http://schemas.openxmlformats.org/drawingml/2006/main" xmlns:r="http://schemas.openxmlformats.org/officeDocument/2006/relationships" xmlns:p="http://schemas.openxmlformats.org/presentationml/2006/main">
+  <p:cSld>
+    <p:spTree>
+      <p:nvGrpSpPr>
+        <p:cNvPr id="1" name=""/>
+        <p:cNvGrpSpPr/>
+        <p:nvPr/>
+      </p:nvGrpSpPr>
+      <p:grpSpPr>
+        <a:xfrm>
+          <a:off x="0" y="0"/>
+          <a:ext cx="0" cy="0"/>
+          <a:chOff x="0" y="0"/>
+          <a:chExt cx="0" cy="0"/>
+        </a:xfrm>
+      </p:grpSpPr>
+      <p:sp>
+        <p:nvSpPr>
+          <p:cNvPr id="2" name="Titel 1">
+            <a:extLst>
+              <a:ext uri="{FF2B5EF4-FFF2-40B4-BE49-F238E27FC236}">
+                <a16:creationId xmlns:a16="http://schemas.microsoft.com/office/drawing/2014/main" id="{661FD3D5-05E5-BB98-FE98-EAB9EA7B8B07}"/>
+              </a:ext>
+            </a:extLst>
+          </p:cNvPr>
+          <p:cNvSpPr>
+            <a:spLocks noGrp="1"/>
+          </p:cNvSpPr>
+          <p:nvPr>
+            <p:ph type="title"/>
+          </p:nvPr>
+        </p:nvSpPr>
+        <p:spPr/>
+        <p:txBody>
+          <a:bodyPr/>
+          <a:lstStyle/>
+          <a:p>
+            <a:r>
+              <a:rPr lang="de-DE" dirty="0"/>
+              <a:t>Dynamische Deadlock-Analyse</a:t>
+            </a:r>
+          </a:p>
+        </p:txBody>
+      </p:sp>
+      <p:sp>
+        <p:nvSpPr>
+          <p:cNvPr id="9" name="Textfeld 8">
+            <a:extLst>
+              <a:ext uri="{FF2B5EF4-FFF2-40B4-BE49-F238E27FC236}">
+                <a16:creationId xmlns:a16="http://schemas.microsoft.com/office/drawing/2014/main" id="{42F91DDC-9C08-AAF8-F17D-84ACF3C79F2B}"/>
+              </a:ext>
+            </a:extLst>
+          </p:cNvPr>
+          <p:cNvSpPr txBox="1"/>
+          <p:nvPr/>
+        </p:nvSpPr>
+        <p:spPr>
+          <a:xfrm>
+            <a:off x="5235327" y="1825625"/>
+            <a:ext cx="5883215" cy="646331"/>
+          </a:xfrm>
+          <a:prstGeom prst="rect">
+            <a:avLst/>
+          </a:prstGeom>
+          <a:noFill/>
+        </p:spPr>
+        <p:txBody>
+          <a:bodyPr wrap="square" rtlCol="0">
+            <a:spAutoFit/>
+          </a:bodyPr>
+          <a:lstStyle/>
+          <a:p>
+            <a:r>
+              <a:rPr lang="de-DE" dirty="0"/>
+              <a:t>Es gibt die Locks x und y im Trace </a:t>
+            </a:r>
+          </a:p>
+          <a:p>
+            <a:pPr marL="285750" indent="-285750">
+              <a:buFont typeface="Wingdings" panose="05000000000000000000" pitchFamily="2" charset="2"/>
+              <a:buChar char="è"/>
+            </a:pPr>
+            <a:r>
+              <a:rPr lang="de-DE" dirty="0"/>
+              <a:t>Knoten x und y im Graph</a:t>
+            </a:r>
+          </a:p>
+        </p:txBody>
+      </p:sp>
+      <p:sp>
+        <p:nvSpPr>
+          <p:cNvPr id="10" name="Ellipse 9">
+            <a:extLst>
+              <a:ext uri="{FF2B5EF4-FFF2-40B4-BE49-F238E27FC236}">
+                <a16:creationId xmlns:a16="http://schemas.microsoft.com/office/drawing/2014/main" id="{B3BE2E0C-42FE-471D-A03E-A9B806CC0DB5}"/>
+              </a:ext>
+            </a:extLst>
+          </p:cNvPr>
+          <p:cNvSpPr/>
+          <p:nvPr/>
+        </p:nvSpPr>
+        <p:spPr>
+          <a:xfrm>
+            <a:off x="5897971" y="4494362"/>
+            <a:ext cx="1242203" cy="836762"/>
+          </a:xfrm>
+          <a:prstGeom prst="ellipse">
+            <a:avLst/>
+          </a:prstGeom>
+          <a:solidFill>
+            <a:schemeClr val="bg1"/>
+          </a:solidFill>
+        </p:spPr>
+        <p:style>
+          <a:lnRef idx="2">
+            <a:schemeClr val="accent1">
+              <a:shade val="15000"/>
+            </a:schemeClr>
+          </a:lnRef>
+          <a:fillRef idx="1">
+            <a:schemeClr val="accent1"/>
+          </a:fillRef>
+          <a:effectRef idx="0">
+            <a:schemeClr val="accent1"/>
+          </a:effectRef>
+          <a:fontRef idx="minor">
+            <a:schemeClr val="lt1"/>
+          </a:fontRef>
+        </p:style>
+        <p:txBody>
+          <a:bodyPr rtlCol="0" anchor="ctr"/>
+          <a:lstStyle/>
+          <a:p>
+            <a:pPr algn="ctr"/>
+            <a:r>
+              <a:rPr lang="de-DE" dirty="0">
+                <a:solidFill>
+                  <a:schemeClr val="tx1"/>
+                </a:solidFill>
+              </a:rPr>
+              <a:t>y</a:t>
+            </a:r>
+          </a:p>
+        </p:txBody>
+      </p:sp>
+      <p:sp>
+        <p:nvSpPr>
+          <p:cNvPr id="12" name="Ellipse 11">
+            <a:extLst>
+              <a:ext uri="{FF2B5EF4-FFF2-40B4-BE49-F238E27FC236}">
+                <a16:creationId xmlns:a16="http://schemas.microsoft.com/office/drawing/2014/main" id="{46165CF1-4BB9-0524-3C11-027ACA7D81ED}"/>
+              </a:ext>
+            </a:extLst>
+          </p:cNvPr>
+          <p:cNvSpPr/>
+          <p:nvPr/>
+        </p:nvSpPr>
+        <p:spPr>
+          <a:xfrm>
+            <a:off x="8625885" y="4494362"/>
+            <a:ext cx="1242203" cy="836762"/>
+          </a:xfrm>
+          <a:prstGeom prst="ellipse">
+            <a:avLst/>
+          </a:prstGeom>
+          <a:solidFill>
+            <a:schemeClr val="bg1"/>
+          </a:solidFill>
+        </p:spPr>
+        <p:style>
+          <a:lnRef idx="2">
+            <a:schemeClr val="accent1">
+              <a:shade val="15000"/>
+            </a:schemeClr>
+          </a:lnRef>
+          <a:fillRef idx="1">
+            <a:schemeClr val="accent1"/>
+          </a:fillRef>
+          <a:effectRef idx="0">
+            <a:schemeClr val="accent1"/>
+          </a:effectRef>
+          <a:fontRef idx="minor">
+            <a:schemeClr val="lt1"/>
+          </a:fontRef>
+        </p:style>
+        <p:txBody>
+          <a:bodyPr rtlCol="0" anchor="ctr"/>
+          <a:lstStyle/>
+          <a:p>
+            <a:pPr algn="ctr"/>
+            <a:r>
+              <a:rPr lang="de-DE" dirty="0">
+                <a:solidFill>
+                  <a:schemeClr val="tx1"/>
+                </a:solidFill>
+              </a:rPr>
+              <a:t>x</a:t>
+            </a:r>
+          </a:p>
+        </p:txBody>
+      </p:sp>
+      <p:pic>
+        <p:nvPicPr>
+          <p:cNvPr id="5" name="Grafik 4">
+            <a:extLst>
+              <a:ext uri="{FF2B5EF4-FFF2-40B4-BE49-F238E27FC236}">
+                <a16:creationId xmlns:a16="http://schemas.microsoft.com/office/drawing/2014/main" id="{2BF424B5-1AE0-85AC-CDD6-A48727ECBDBE}"/>
+              </a:ext>
+            </a:extLst>
+          </p:cNvPr>
+          <p:cNvPicPr>
+            <a:picLocks noChangeAspect="1"/>
+          </p:cNvPicPr>
+          <p:nvPr/>
+        </p:nvPicPr>
+        <p:blipFill>
+          <a:blip r:embed="rId2"/>
+          <a:stretch>
+            <a:fillRect/>
+          </a:stretch>
+        </p:blipFill>
+        <p:spPr>
+          <a:xfrm>
+            <a:off x="838199" y="1825625"/>
+            <a:ext cx="4326489" cy="4238745"/>
+          </a:xfrm>
+          <a:prstGeom prst="rect">
+            <a:avLst/>
+          </a:prstGeom>
+          <a:ln>
+            <a:solidFill>
+              <a:schemeClr val="tx1"/>
+            </a:solidFill>
+          </a:ln>
+        </p:spPr>
+      </p:pic>
+    </p:spTree>
+    <p:extLst>
+      <p:ext uri="{BB962C8B-B14F-4D97-AF65-F5344CB8AC3E}">
+        <p14:creationId xmlns:p14="http://schemas.microsoft.com/office/powerpoint/2010/main" val="3694205626"/>
+      </p:ext>
+    </p:extLst>
+  </p:cSld>
+  <p:clrMapOvr>
+    <a:masterClrMapping/>
+  </p:clrMapOvr>
+</p:sld>
+</file>
+
+<file path=ppt/slides/slide15.xml><?xml version="1.0" encoding="utf-8"?>
+<p:sld xmlns:a="http://schemas.openxmlformats.org/drawingml/2006/main" xmlns:r="http://schemas.openxmlformats.org/officeDocument/2006/relationships" xmlns:p="http://schemas.openxmlformats.org/presentationml/2006/main">
+  <p:cSld>
+    <p:spTree>
+      <p:nvGrpSpPr>
+        <p:cNvPr id="1" name=""/>
+        <p:cNvGrpSpPr/>
+        <p:nvPr/>
+      </p:nvGrpSpPr>
+      <p:grpSpPr>
+        <a:xfrm>
+          <a:off x="0" y="0"/>
+          <a:ext cx="0" cy="0"/>
+          <a:chOff x="0" y="0"/>
+          <a:chExt cx="0" cy="0"/>
+        </a:xfrm>
+      </p:grpSpPr>
+      <p:sp>
+        <p:nvSpPr>
+          <p:cNvPr id="2" name="Titel 1">
+            <a:extLst>
+              <a:ext uri="{FF2B5EF4-FFF2-40B4-BE49-F238E27FC236}">
+                <a16:creationId xmlns:a16="http://schemas.microsoft.com/office/drawing/2014/main" id="{661FD3D5-05E5-BB98-FE98-EAB9EA7B8B07}"/>
+              </a:ext>
+            </a:extLst>
+          </p:cNvPr>
+          <p:cNvSpPr>
+            <a:spLocks noGrp="1"/>
+          </p:cNvSpPr>
+          <p:nvPr>
+            <p:ph type="title"/>
+          </p:nvPr>
+        </p:nvSpPr>
+        <p:spPr/>
+        <p:txBody>
+          <a:bodyPr/>
+          <a:lstStyle/>
+          <a:p>
+            <a:r>
+              <a:rPr lang="de-DE" dirty="0"/>
+              <a:t>Dynamische Deadlock-Analyse</a:t>
+            </a:r>
+          </a:p>
+        </p:txBody>
+      </p:sp>
+      <p:sp>
+        <p:nvSpPr>
+          <p:cNvPr id="9" name="Textfeld 8">
+            <a:extLst>
+              <a:ext uri="{FF2B5EF4-FFF2-40B4-BE49-F238E27FC236}">
+                <a16:creationId xmlns:a16="http://schemas.microsoft.com/office/drawing/2014/main" id="{42F91DDC-9C08-AAF8-F17D-84ACF3C79F2B}"/>
+              </a:ext>
+            </a:extLst>
+          </p:cNvPr>
+          <p:cNvSpPr txBox="1"/>
+          <p:nvPr/>
+        </p:nvSpPr>
+        <p:spPr>
+          <a:xfrm>
+            <a:off x="5235327" y="1825625"/>
+            <a:ext cx="5883215" cy="1200329"/>
+          </a:xfrm>
+          <a:prstGeom prst="rect">
+            <a:avLst/>
+          </a:prstGeom>
+          <a:noFill/>
+        </p:spPr>
+        <p:txBody>
+          <a:bodyPr wrap="square" rtlCol="0">
+            <a:spAutoFit/>
+          </a:bodyPr>
+          <a:lstStyle/>
+          <a:p>
+            <a:r>
+              <a:rPr lang="de-DE" dirty="0"/>
+              <a:t>Es gibt die Locks x und y im Trace </a:t>
+            </a:r>
+          </a:p>
+          <a:p>
+            <a:pPr marL="285750" indent="-285750">
+              <a:buFont typeface="Wingdings" panose="05000000000000000000" pitchFamily="2" charset="2"/>
+              <a:buChar char="è"/>
+            </a:pPr>
+            <a:r>
+              <a:rPr lang="de-DE" dirty="0"/>
+              <a:t>Knoten x und y im Graph</a:t>
+            </a:r>
+          </a:p>
+          <a:p>
+            <a:r>
+              <a:rPr lang="de-DE" dirty="0"/>
+              <a:t>In T1 wird nach Lock y Lock x reserviert</a:t>
+            </a:r>
+          </a:p>
+          <a:p>
+            <a:pPr marL="285750" indent="-285750">
+              <a:buFont typeface="Wingdings" panose="05000000000000000000" pitchFamily="2" charset="2"/>
+              <a:buChar char="è"/>
+            </a:pPr>
+            <a:r>
+              <a:rPr lang="de-DE" dirty="0"/>
+              <a:t>Kante von y nach x</a:t>
+            </a:r>
+          </a:p>
+        </p:txBody>
+      </p:sp>
+      <p:sp>
+        <p:nvSpPr>
+          <p:cNvPr id="10" name="Ellipse 9">
+            <a:extLst>
+              <a:ext uri="{FF2B5EF4-FFF2-40B4-BE49-F238E27FC236}">
+                <a16:creationId xmlns:a16="http://schemas.microsoft.com/office/drawing/2014/main" id="{B3BE2E0C-42FE-471D-A03E-A9B806CC0DB5}"/>
+              </a:ext>
+            </a:extLst>
+          </p:cNvPr>
+          <p:cNvSpPr/>
+          <p:nvPr/>
+        </p:nvSpPr>
+        <p:spPr>
+          <a:xfrm>
+            <a:off x="5897971" y="4494362"/>
+            <a:ext cx="1242203" cy="836762"/>
+          </a:xfrm>
+          <a:prstGeom prst="ellipse">
+            <a:avLst/>
+          </a:prstGeom>
+          <a:solidFill>
+            <a:schemeClr val="bg1"/>
+          </a:solidFill>
+        </p:spPr>
+        <p:style>
+          <a:lnRef idx="2">
+            <a:schemeClr val="accent1">
+              <a:shade val="15000"/>
+            </a:schemeClr>
+          </a:lnRef>
+          <a:fillRef idx="1">
+            <a:schemeClr val="accent1"/>
+          </a:fillRef>
+          <a:effectRef idx="0">
+            <a:schemeClr val="accent1"/>
+          </a:effectRef>
+          <a:fontRef idx="minor">
+            <a:schemeClr val="lt1"/>
+          </a:fontRef>
+        </p:style>
+        <p:txBody>
+          <a:bodyPr rtlCol="0" anchor="ctr"/>
+          <a:lstStyle/>
+          <a:p>
+            <a:pPr algn="ctr"/>
+            <a:r>
+              <a:rPr lang="de-DE" dirty="0">
+                <a:solidFill>
+                  <a:schemeClr val="tx1"/>
+                </a:solidFill>
+              </a:rPr>
+              <a:t>y</a:t>
+            </a:r>
+          </a:p>
+        </p:txBody>
+      </p:sp>
+      <p:sp>
+        <p:nvSpPr>
+          <p:cNvPr id="12" name="Ellipse 11">
+            <a:extLst>
+              <a:ext uri="{FF2B5EF4-FFF2-40B4-BE49-F238E27FC236}">
+                <a16:creationId xmlns:a16="http://schemas.microsoft.com/office/drawing/2014/main" id="{46165CF1-4BB9-0524-3C11-027ACA7D81ED}"/>
+              </a:ext>
+            </a:extLst>
+          </p:cNvPr>
+          <p:cNvSpPr/>
+          <p:nvPr/>
+        </p:nvSpPr>
+        <p:spPr>
+          <a:xfrm>
+            <a:off x="8625885" y="4494362"/>
+            <a:ext cx="1242203" cy="836762"/>
+          </a:xfrm>
+          <a:prstGeom prst="ellipse">
+            <a:avLst/>
+          </a:prstGeom>
+          <a:solidFill>
+            <a:schemeClr val="bg1"/>
+          </a:solidFill>
+        </p:spPr>
+        <p:style>
+          <a:lnRef idx="2">
+            <a:schemeClr val="accent1">
+              <a:shade val="15000"/>
+            </a:schemeClr>
+          </a:lnRef>
+          <a:fillRef idx="1">
+            <a:schemeClr val="accent1"/>
+          </a:fillRef>
+          <a:effectRef idx="0">
+            <a:schemeClr val="accent1"/>
+          </a:effectRef>
+          <a:fontRef idx="minor">
+            <a:schemeClr val="lt1"/>
+          </a:fontRef>
+        </p:style>
+        <p:txBody>
+          <a:bodyPr rtlCol="0" anchor="ctr"/>
+          <a:lstStyle/>
+          <a:p>
+            <a:pPr algn="ctr"/>
+            <a:r>
+              <a:rPr lang="de-DE" dirty="0">
+                <a:solidFill>
+                  <a:schemeClr val="tx1"/>
+                </a:solidFill>
+              </a:rPr>
+              <a:t>x</a:t>
+            </a:r>
+          </a:p>
+        </p:txBody>
+      </p:sp>
+      <p:pic>
+        <p:nvPicPr>
+          <p:cNvPr id="5" name="Grafik 4">
+            <a:extLst>
+              <a:ext uri="{FF2B5EF4-FFF2-40B4-BE49-F238E27FC236}">
+                <a16:creationId xmlns:a16="http://schemas.microsoft.com/office/drawing/2014/main" id="{2BF424B5-1AE0-85AC-CDD6-A48727ECBDBE}"/>
+              </a:ext>
+            </a:extLst>
+          </p:cNvPr>
+          <p:cNvPicPr>
+            <a:picLocks noChangeAspect="1"/>
+          </p:cNvPicPr>
+          <p:nvPr/>
+        </p:nvPicPr>
+        <p:blipFill>
+          <a:blip r:embed="rId2"/>
+          <a:stretch>
+            <a:fillRect/>
+          </a:stretch>
+        </p:blipFill>
+        <p:spPr>
+          <a:xfrm>
+            <a:off x="838199" y="1825625"/>
+            <a:ext cx="4326489" cy="4238745"/>
+          </a:xfrm>
+          <a:prstGeom prst="rect">
+            <a:avLst/>
+          </a:prstGeom>
+          <a:ln>
+            <a:solidFill>
+              <a:schemeClr val="tx1"/>
+            </a:solidFill>
+          </a:ln>
+        </p:spPr>
+      </p:pic>
+      <p:cxnSp>
+        <p:nvCxnSpPr>
+          <p:cNvPr id="4" name="Verbinder: gekrümmt 3">
+            <a:extLst>
+              <a:ext uri="{FF2B5EF4-FFF2-40B4-BE49-F238E27FC236}">
+                <a16:creationId xmlns:a16="http://schemas.microsoft.com/office/drawing/2014/main" id="{28837C48-F214-DA62-CEA2-044D2437EC29}"/>
+              </a:ext>
+            </a:extLst>
+          </p:cNvPr>
+          <p:cNvCxnSpPr>
+            <a:cxnSpLocks/>
+            <a:stCxn id="10" idx="0"/>
+            <a:endCxn id="12" idx="0"/>
+          </p:cNvCxnSpPr>
+          <p:nvPr/>
+        </p:nvCxnSpPr>
+        <p:spPr>
+          <a:xfrm rot="5400000" flipH="1" flipV="1">
+            <a:off x="7883030" y="3130405"/>
+            <a:ext cx="12700" cy="2727914"/>
+          </a:xfrm>
+          <a:prstGeom prst="curvedConnector3">
+            <a:avLst>
+              <a:gd name="adj1" fmla="val 1800000"/>
+            </a:avLst>
+          </a:prstGeom>
+          <a:ln>
+            <a:tailEnd type="triangle"/>
+          </a:ln>
+        </p:spPr>
+        <p:style>
+          <a:lnRef idx="1">
+            <a:schemeClr val="accent1"/>
+          </a:lnRef>
+          <a:fillRef idx="0">
+            <a:schemeClr val="accent1"/>
+          </a:fillRef>
+          <a:effectRef idx="0">
+            <a:schemeClr val="accent1"/>
+          </a:effectRef>
+          <a:fontRef idx="minor">
+            <a:schemeClr val="tx1"/>
+          </a:fontRef>
+        </p:style>
+      </p:cxnSp>
+    </p:spTree>
+    <p:extLst>
+      <p:ext uri="{BB962C8B-B14F-4D97-AF65-F5344CB8AC3E}">
+        <p14:creationId xmlns:p14="http://schemas.microsoft.com/office/powerpoint/2010/main" val="3807981448"/>
+      </p:ext>
+    </p:extLst>
+  </p:cSld>
+  <p:clrMapOvr>
+    <a:masterClrMapping/>
+  </p:clrMapOvr>
+</p:sld>
+</file>
+
+<file path=ppt/slides/slide16.xml><?xml version="1.0" encoding="utf-8"?>
+<p:sld xmlns:a="http://schemas.openxmlformats.org/drawingml/2006/main" xmlns:r="http://schemas.openxmlformats.org/officeDocument/2006/relationships" xmlns:p="http://schemas.openxmlformats.org/presentationml/2006/main">
+  <p:cSld>
+    <p:spTree>
+      <p:nvGrpSpPr>
+        <p:cNvPr id="1" name=""/>
+        <p:cNvGrpSpPr/>
+        <p:nvPr/>
+      </p:nvGrpSpPr>
+      <p:grpSpPr>
+        <a:xfrm>
+          <a:off x="0" y="0"/>
+          <a:ext cx="0" cy="0"/>
+          <a:chOff x="0" y="0"/>
+          <a:chExt cx="0" cy="0"/>
+        </a:xfrm>
+      </p:grpSpPr>
+      <p:sp>
+        <p:nvSpPr>
+          <p:cNvPr id="2" name="Titel 1">
+            <a:extLst>
+              <a:ext uri="{FF2B5EF4-FFF2-40B4-BE49-F238E27FC236}">
+                <a16:creationId xmlns:a16="http://schemas.microsoft.com/office/drawing/2014/main" id="{661FD3D5-05E5-BB98-FE98-EAB9EA7B8B07}"/>
+              </a:ext>
+            </a:extLst>
+          </p:cNvPr>
+          <p:cNvSpPr>
+            <a:spLocks noGrp="1"/>
+          </p:cNvSpPr>
+          <p:nvPr>
+            <p:ph type="title"/>
+          </p:nvPr>
+        </p:nvSpPr>
+        <p:spPr/>
+        <p:txBody>
+          <a:bodyPr/>
+          <a:lstStyle/>
+          <a:p>
+            <a:r>
+              <a:rPr lang="de-DE" dirty="0"/>
+              <a:t>Dynamische Deadlock-Analyse</a:t>
+            </a:r>
+          </a:p>
+        </p:txBody>
+      </p:sp>
+      <p:sp>
+        <p:nvSpPr>
+          <p:cNvPr id="9" name="Textfeld 8">
+            <a:extLst>
+              <a:ext uri="{FF2B5EF4-FFF2-40B4-BE49-F238E27FC236}">
+                <a16:creationId xmlns:a16="http://schemas.microsoft.com/office/drawing/2014/main" id="{42F91DDC-9C08-AAF8-F17D-84ACF3C79F2B}"/>
+              </a:ext>
+            </a:extLst>
+          </p:cNvPr>
+          <p:cNvSpPr txBox="1"/>
+          <p:nvPr/>
+        </p:nvSpPr>
+        <p:spPr>
+          <a:xfrm>
+            <a:off x="5235327" y="1825625"/>
+            <a:ext cx="5883215" cy="1754326"/>
+          </a:xfrm>
+          <a:prstGeom prst="rect">
+            <a:avLst/>
+          </a:prstGeom>
+          <a:noFill/>
+        </p:spPr>
+        <p:txBody>
+          <a:bodyPr wrap="square" rtlCol="0">
+            <a:spAutoFit/>
+          </a:bodyPr>
+          <a:lstStyle/>
+          <a:p>
+            <a:r>
+              <a:rPr lang="de-DE" dirty="0"/>
+              <a:t>Es gibt die Locks x und y im Trace </a:t>
+            </a:r>
+          </a:p>
+          <a:p>
+            <a:pPr marL="285750" indent="-285750">
+              <a:buFont typeface="Wingdings" panose="05000000000000000000" pitchFamily="2" charset="2"/>
+              <a:buChar char="è"/>
+            </a:pPr>
+            <a:r>
+              <a:rPr lang="de-DE" dirty="0"/>
+              <a:t>Knoten x und y im Graph</a:t>
+            </a:r>
+          </a:p>
+          <a:p>
+            <a:r>
+              <a:rPr lang="de-DE" dirty="0"/>
+              <a:t>In T1 wird nach Lock y Lock x reserviert</a:t>
+            </a:r>
+          </a:p>
+          <a:p>
+            <a:pPr marL="285750" indent="-285750">
+              <a:buFont typeface="Wingdings" panose="05000000000000000000" pitchFamily="2" charset="2"/>
+              <a:buChar char="è"/>
+            </a:pPr>
+            <a:r>
+              <a:rPr lang="de-DE" dirty="0"/>
+              <a:t>Kante von y nach x</a:t>
+            </a:r>
+          </a:p>
+          <a:p>
+            <a:r>
+              <a:rPr lang="de-DE" dirty="0"/>
+              <a:t>In T1 wird nach Lock x Lock y reserviert</a:t>
+            </a:r>
+          </a:p>
+          <a:p>
+            <a:pPr marL="285750" indent="-285750">
+              <a:buFont typeface="Wingdings" panose="05000000000000000000" pitchFamily="2" charset="2"/>
+              <a:buChar char="è"/>
+            </a:pPr>
+            <a:r>
+              <a:rPr lang="de-DE" dirty="0"/>
+              <a:t>Kante von x nach y</a:t>
+            </a:r>
+          </a:p>
+        </p:txBody>
+      </p:sp>
+      <p:sp>
+        <p:nvSpPr>
+          <p:cNvPr id="10" name="Ellipse 9">
+            <a:extLst>
+              <a:ext uri="{FF2B5EF4-FFF2-40B4-BE49-F238E27FC236}">
+                <a16:creationId xmlns:a16="http://schemas.microsoft.com/office/drawing/2014/main" id="{B3BE2E0C-42FE-471D-A03E-A9B806CC0DB5}"/>
+              </a:ext>
+            </a:extLst>
+          </p:cNvPr>
+          <p:cNvSpPr/>
+          <p:nvPr/>
+        </p:nvSpPr>
+        <p:spPr>
+          <a:xfrm>
+            <a:off x="5897971" y="4494362"/>
+            <a:ext cx="1242203" cy="836762"/>
+          </a:xfrm>
+          <a:prstGeom prst="ellipse">
+            <a:avLst/>
+          </a:prstGeom>
+          <a:solidFill>
+            <a:schemeClr val="bg1"/>
+          </a:solidFill>
+        </p:spPr>
+        <p:style>
+          <a:lnRef idx="2">
+            <a:schemeClr val="accent1">
+              <a:shade val="15000"/>
+            </a:schemeClr>
+          </a:lnRef>
+          <a:fillRef idx="1">
+            <a:schemeClr val="accent1"/>
+          </a:fillRef>
+          <a:effectRef idx="0">
+            <a:schemeClr val="accent1"/>
+          </a:effectRef>
+          <a:fontRef idx="minor">
+            <a:schemeClr val="lt1"/>
+          </a:fontRef>
+        </p:style>
+        <p:txBody>
+          <a:bodyPr rtlCol="0" anchor="ctr"/>
+          <a:lstStyle/>
+          <a:p>
+            <a:pPr algn="ctr"/>
+            <a:r>
+              <a:rPr lang="de-DE" dirty="0">
+                <a:solidFill>
+                  <a:schemeClr val="tx1"/>
+                </a:solidFill>
+              </a:rPr>
+              <a:t>y</a:t>
+            </a:r>
+          </a:p>
+        </p:txBody>
+      </p:sp>
+      <p:sp>
+        <p:nvSpPr>
+          <p:cNvPr id="12" name="Ellipse 11">
+            <a:extLst>
+              <a:ext uri="{FF2B5EF4-FFF2-40B4-BE49-F238E27FC236}">
+                <a16:creationId xmlns:a16="http://schemas.microsoft.com/office/drawing/2014/main" id="{46165CF1-4BB9-0524-3C11-027ACA7D81ED}"/>
+              </a:ext>
+            </a:extLst>
+          </p:cNvPr>
+          <p:cNvSpPr/>
+          <p:nvPr/>
+        </p:nvSpPr>
+        <p:spPr>
+          <a:xfrm>
+            <a:off x="8625885" y="4494362"/>
+            <a:ext cx="1242203" cy="836762"/>
+          </a:xfrm>
+          <a:prstGeom prst="ellipse">
+            <a:avLst/>
+          </a:prstGeom>
+          <a:solidFill>
+            <a:schemeClr val="bg1"/>
+          </a:solidFill>
+        </p:spPr>
+        <p:style>
+          <a:lnRef idx="2">
+            <a:schemeClr val="accent1">
+              <a:shade val="15000"/>
+            </a:schemeClr>
+          </a:lnRef>
+          <a:fillRef idx="1">
+            <a:schemeClr val="accent1"/>
+          </a:fillRef>
+          <a:effectRef idx="0">
+            <a:schemeClr val="accent1"/>
+          </a:effectRef>
+          <a:fontRef idx="minor">
+            <a:schemeClr val="lt1"/>
+          </a:fontRef>
+        </p:style>
+        <p:txBody>
+          <a:bodyPr rtlCol="0" anchor="ctr"/>
+          <a:lstStyle/>
+          <a:p>
+            <a:pPr algn="ctr"/>
+            <a:r>
+              <a:rPr lang="de-DE" dirty="0">
+                <a:solidFill>
+                  <a:schemeClr val="tx1"/>
+                </a:solidFill>
+              </a:rPr>
+              <a:t>x</a:t>
+            </a:r>
+          </a:p>
+        </p:txBody>
+      </p:sp>
+      <p:pic>
+        <p:nvPicPr>
+          <p:cNvPr id="5" name="Grafik 4">
+            <a:extLst>
+              <a:ext uri="{FF2B5EF4-FFF2-40B4-BE49-F238E27FC236}">
+                <a16:creationId xmlns:a16="http://schemas.microsoft.com/office/drawing/2014/main" id="{2BF424B5-1AE0-85AC-CDD6-A48727ECBDBE}"/>
+              </a:ext>
+            </a:extLst>
+          </p:cNvPr>
+          <p:cNvPicPr>
+            <a:picLocks noChangeAspect="1"/>
+          </p:cNvPicPr>
+          <p:nvPr/>
+        </p:nvPicPr>
+        <p:blipFill>
+          <a:blip r:embed="rId2"/>
+          <a:stretch>
+            <a:fillRect/>
+          </a:stretch>
+        </p:blipFill>
+        <p:spPr>
+          <a:xfrm>
+            <a:off x="838199" y="1825625"/>
+            <a:ext cx="4326489" cy="4238745"/>
+          </a:xfrm>
+          <a:prstGeom prst="rect">
+            <a:avLst/>
+          </a:prstGeom>
+          <a:ln>
+            <a:solidFill>
+              <a:schemeClr val="tx1"/>
+            </a:solidFill>
+          </a:ln>
+        </p:spPr>
+      </p:pic>
+      <p:cxnSp>
+        <p:nvCxnSpPr>
+          <p:cNvPr id="4" name="Verbinder: gekrümmt 3">
+            <a:extLst>
+              <a:ext uri="{FF2B5EF4-FFF2-40B4-BE49-F238E27FC236}">
+                <a16:creationId xmlns:a16="http://schemas.microsoft.com/office/drawing/2014/main" id="{28837C48-F214-DA62-CEA2-044D2437EC29}"/>
+              </a:ext>
+            </a:extLst>
+          </p:cNvPr>
+          <p:cNvCxnSpPr>
+            <a:cxnSpLocks/>
+            <a:stCxn id="10" idx="0"/>
+            <a:endCxn id="12" idx="0"/>
+          </p:cNvCxnSpPr>
+          <p:nvPr/>
+        </p:nvCxnSpPr>
+        <p:spPr>
+          <a:xfrm rot="5400000" flipH="1" flipV="1">
+            <a:off x="7883030" y="3130405"/>
+            <a:ext cx="12700" cy="2727914"/>
+          </a:xfrm>
+          <a:prstGeom prst="curvedConnector3">
+            <a:avLst>
+              <a:gd name="adj1" fmla="val 1800000"/>
+            </a:avLst>
+          </a:prstGeom>
+          <a:ln>
+            <a:tailEnd type="triangle"/>
+          </a:ln>
+        </p:spPr>
+        <p:style>
+          <a:lnRef idx="1">
+            <a:schemeClr val="accent1"/>
+          </a:lnRef>
+          <a:fillRef idx="0">
+            <a:schemeClr val="accent1"/>
+          </a:fillRef>
+          <a:effectRef idx="0">
+            <a:schemeClr val="accent1"/>
+          </a:effectRef>
+          <a:fontRef idx="minor">
+            <a:schemeClr val="tx1"/>
+          </a:fontRef>
+        </p:style>
+      </p:cxnSp>
+      <p:cxnSp>
+        <p:nvCxnSpPr>
+          <p:cNvPr id="11" name="Verbinder: gekrümmt 10">
+            <a:extLst>
+              <a:ext uri="{FF2B5EF4-FFF2-40B4-BE49-F238E27FC236}">
+                <a16:creationId xmlns:a16="http://schemas.microsoft.com/office/drawing/2014/main" id="{C8C8FB1E-C766-BBAB-0476-EA139E523262}"/>
+              </a:ext>
+            </a:extLst>
+          </p:cNvPr>
+          <p:cNvCxnSpPr>
+            <a:cxnSpLocks/>
+            <a:stCxn id="12" idx="4"/>
+            <a:endCxn id="10" idx="4"/>
+          </p:cNvCxnSpPr>
+          <p:nvPr/>
+        </p:nvCxnSpPr>
+        <p:spPr>
+          <a:xfrm rot="5400000">
+            <a:off x="7883030" y="3967167"/>
+            <a:ext cx="12700" cy="2727914"/>
+          </a:xfrm>
+          <a:prstGeom prst="curvedConnector3">
+            <a:avLst>
+              <a:gd name="adj1" fmla="val 1800000"/>
+            </a:avLst>
+          </a:prstGeom>
+          <a:ln>
+            <a:tailEnd type="triangle"/>
+          </a:ln>
+        </p:spPr>
+        <p:style>
+          <a:lnRef idx="1">
+            <a:schemeClr val="accent1"/>
+          </a:lnRef>
+          <a:fillRef idx="0">
+            <a:schemeClr val="accent1"/>
+          </a:fillRef>
+          <a:effectRef idx="0">
+            <a:schemeClr val="accent1"/>
+          </a:effectRef>
+          <a:fontRef idx="minor">
+            <a:schemeClr val="tx1"/>
+          </a:fontRef>
+        </p:style>
+      </p:cxnSp>
+    </p:spTree>
+    <p:extLst>
+      <p:ext uri="{BB962C8B-B14F-4D97-AF65-F5344CB8AC3E}">
+        <p14:creationId xmlns:p14="http://schemas.microsoft.com/office/powerpoint/2010/main" val="1656782471"/>
+      </p:ext>
+    </p:extLst>
+  </p:cSld>
+  <p:clrMapOvr>
+    <a:masterClrMapping/>
+  </p:clrMapOvr>
+</p:sld>
+</file>
+
+<file path=ppt/slides/slide17.xml><?xml version="1.0" encoding="utf-8"?>
+<p:sld xmlns:a="http://schemas.openxmlformats.org/drawingml/2006/main" xmlns:r="http://schemas.openxmlformats.org/officeDocument/2006/relationships" xmlns:p="http://schemas.openxmlformats.org/presentationml/2006/main">
+  <p:cSld>
+    <p:spTree>
+      <p:nvGrpSpPr>
+        <p:cNvPr id="1" name=""/>
+        <p:cNvGrpSpPr/>
+        <p:nvPr/>
+      </p:nvGrpSpPr>
+      <p:grpSpPr>
+        <a:xfrm>
+          <a:off x="0" y="0"/>
+          <a:ext cx="0" cy="0"/>
+          <a:chOff x="0" y="0"/>
+          <a:chExt cx="0" cy="0"/>
+        </a:xfrm>
+      </p:grpSpPr>
+      <p:sp>
+        <p:nvSpPr>
+          <p:cNvPr id="2" name="Titel 1">
+            <a:extLst>
+              <a:ext uri="{FF2B5EF4-FFF2-40B4-BE49-F238E27FC236}">
+                <a16:creationId xmlns:a16="http://schemas.microsoft.com/office/drawing/2014/main" id="{661FD3D5-05E5-BB98-FE98-EAB9EA7B8B07}"/>
+              </a:ext>
+            </a:extLst>
+          </p:cNvPr>
+          <p:cNvSpPr>
+            <a:spLocks noGrp="1"/>
+          </p:cNvSpPr>
+          <p:nvPr>
+            <p:ph type="title"/>
+          </p:nvPr>
+        </p:nvSpPr>
+        <p:spPr/>
+        <p:txBody>
+          <a:bodyPr/>
+          <a:lstStyle/>
+          <a:p>
+            <a:r>
+              <a:rPr lang="de-DE" dirty="0"/>
+              <a:t>Dynamische Deadlock-Analyse</a:t>
+            </a:r>
+          </a:p>
+        </p:txBody>
+      </p:sp>
+      <p:sp>
+        <p:nvSpPr>
+          <p:cNvPr id="9" name="Textfeld 8">
+            <a:extLst>
+              <a:ext uri="{FF2B5EF4-FFF2-40B4-BE49-F238E27FC236}">
+                <a16:creationId xmlns:a16="http://schemas.microsoft.com/office/drawing/2014/main" id="{42F91DDC-9C08-AAF8-F17D-84ACF3C79F2B}"/>
+              </a:ext>
+            </a:extLst>
+          </p:cNvPr>
+          <p:cNvSpPr txBox="1"/>
+          <p:nvPr/>
+        </p:nvSpPr>
+        <p:spPr>
+          <a:xfrm>
+            <a:off x="5235327" y="1825625"/>
+            <a:ext cx="5883215" cy="1754326"/>
+          </a:xfrm>
+          <a:prstGeom prst="rect">
+            <a:avLst/>
+          </a:prstGeom>
+          <a:noFill/>
+        </p:spPr>
+        <p:txBody>
+          <a:bodyPr wrap="square" rtlCol="0">
+            <a:spAutoFit/>
+          </a:bodyPr>
+          <a:lstStyle/>
+          <a:p>
+            <a:r>
+              <a:rPr lang="de-DE" dirty="0"/>
+              <a:t>Es gibt die Locks x und y im Trace </a:t>
+            </a:r>
+          </a:p>
+          <a:p>
+            <a:pPr marL="285750" indent="-285750">
+              <a:buFont typeface="Wingdings" panose="05000000000000000000" pitchFamily="2" charset="2"/>
+              <a:buChar char="è"/>
+            </a:pPr>
+            <a:r>
+              <a:rPr lang="de-DE" dirty="0"/>
+              <a:t>Knoten x und y im Graph</a:t>
+            </a:r>
+          </a:p>
+          <a:p>
+            <a:r>
+              <a:rPr lang="de-DE" dirty="0"/>
+              <a:t>In T1 wird nach Lock y Lock x reserviert</a:t>
+            </a:r>
+          </a:p>
+          <a:p>
+            <a:pPr marL="285750" indent="-285750">
+              <a:buFont typeface="Wingdings" panose="05000000000000000000" pitchFamily="2" charset="2"/>
+              <a:buChar char="è"/>
+            </a:pPr>
+            <a:r>
+              <a:rPr lang="de-DE" dirty="0"/>
+              <a:t>Kante von y nach x</a:t>
+            </a:r>
+          </a:p>
+          <a:p>
+            <a:r>
+              <a:rPr lang="de-DE" dirty="0"/>
+              <a:t>In T1 wird nach Lock x Lock y reserviert</a:t>
+            </a:r>
+          </a:p>
+          <a:p>
+            <a:pPr marL="285750" indent="-285750">
+              <a:buFont typeface="Wingdings" panose="05000000000000000000" pitchFamily="2" charset="2"/>
+              <a:buChar char="è"/>
+            </a:pPr>
+            <a:r>
+              <a:rPr lang="de-DE" dirty="0"/>
+              <a:t>Kante von x nach y</a:t>
+            </a:r>
+          </a:p>
+        </p:txBody>
+      </p:sp>
+      <p:sp>
+        <p:nvSpPr>
+          <p:cNvPr id="10" name="Ellipse 9">
+            <a:extLst>
+              <a:ext uri="{FF2B5EF4-FFF2-40B4-BE49-F238E27FC236}">
+                <a16:creationId xmlns:a16="http://schemas.microsoft.com/office/drawing/2014/main" id="{B3BE2E0C-42FE-471D-A03E-A9B806CC0DB5}"/>
+              </a:ext>
+            </a:extLst>
+          </p:cNvPr>
+          <p:cNvSpPr/>
+          <p:nvPr/>
+        </p:nvSpPr>
+        <p:spPr>
+          <a:xfrm>
+            <a:off x="5897971" y="4494362"/>
+            <a:ext cx="1242203" cy="836762"/>
+          </a:xfrm>
+          <a:prstGeom prst="ellipse">
+            <a:avLst/>
+          </a:prstGeom>
+          <a:solidFill>
+            <a:schemeClr val="bg1"/>
+          </a:solidFill>
+        </p:spPr>
+        <p:style>
+          <a:lnRef idx="2">
+            <a:schemeClr val="accent1">
+              <a:shade val="15000"/>
+            </a:schemeClr>
+          </a:lnRef>
+          <a:fillRef idx="1">
+            <a:schemeClr val="accent1"/>
+          </a:fillRef>
+          <a:effectRef idx="0">
+            <a:schemeClr val="accent1"/>
+          </a:effectRef>
+          <a:fontRef idx="minor">
+            <a:schemeClr val="lt1"/>
+          </a:fontRef>
+        </p:style>
+        <p:txBody>
+          <a:bodyPr rtlCol="0" anchor="ctr"/>
+          <a:lstStyle/>
+          <a:p>
+            <a:pPr algn="ctr"/>
+            <a:r>
+              <a:rPr lang="de-DE" dirty="0">
+                <a:solidFill>
+                  <a:schemeClr val="tx1"/>
+                </a:solidFill>
+              </a:rPr>
+              <a:t>y</a:t>
+            </a:r>
+          </a:p>
+        </p:txBody>
+      </p:sp>
+      <p:sp>
+        <p:nvSpPr>
+          <p:cNvPr id="12" name="Ellipse 11">
+            <a:extLst>
+              <a:ext uri="{FF2B5EF4-FFF2-40B4-BE49-F238E27FC236}">
+                <a16:creationId xmlns:a16="http://schemas.microsoft.com/office/drawing/2014/main" id="{46165CF1-4BB9-0524-3C11-027ACA7D81ED}"/>
+              </a:ext>
+            </a:extLst>
+          </p:cNvPr>
+          <p:cNvSpPr/>
+          <p:nvPr/>
+        </p:nvSpPr>
+        <p:spPr>
+          <a:xfrm>
+            <a:off x="8625885" y="4494362"/>
+            <a:ext cx="1242203" cy="836762"/>
+          </a:xfrm>
+          <a:prstGeom prst="ellipse">
+            <a:avLst/>
+          </a:prstGeom>
+          <a:solidFill>
+            <a:schemeClr val="bg1"/>
+          </a:solidFill>
+        </p:spPr>
+        <p:style>
+          <a:lnRef idx="2">
+            <a:schemeClr val="accent1">
+              <a:shade val="15000"/>
+            </a:schemeClr>
+          </a:lnRef>
+          <a:fillRef idx="1">
+            <a:schemeClr val="accent1"/>
+          </a:fillRef>
+          <a:effectRef idx="0">
+            <a:schemeClr val="accent1"/>
+          </a:effectRef>
+          <a:fontRef idx="minor">
+            <a:schemeClr val="lt1"/>
+          </a:fontRef>
+        </p:style>
+        <p:txBody>
+          <a:bodyPr rtlCol="0" anchor="ctr"/>
+          <a:lstStyle/>
+          <a:p>
+            <a:pPr algn="ctr"/>
+            <a:r>
+              <a:rPr lang="de-DE" dirty="0">
+                <a:solidFill>
+                  <a:schemeClr val="tx1"/>
+                </a:solidFill>
+              </a:rPr>
+              <a:t>x</a:t>
+            </a:r>
+          </a:p>
+        </p:txBody>
+      </p:sp>
+      <p:pic>
+        <p:nvPicPr>
+          <p:cNvPr id="5" name="Grafik 4">
+            <a:extLst>
+              <a:ext uri="{FF2B5EF4-FFF2-40B4-BE49-F238E27FC236}">
+                <a16:creationId xmlns:a16="http://schemas.microsoft.com/office/drawing/2014/main" id="{2BF424B5-1AE0-85AC-CDD6-A48727ECBDBE}"/>
+              </a:ext>
+            </a:extLst>
+          </p:cNvPr>
+          <p:cNvPicPr>
+            <a:picLocks noChangeAspect="1"/>
+          </p:cNvPicPr>
+          <p:nvPr/>
+        </p:nvPicPr>
+        <p:blipFill>
+          <a:blip r:embed="rId2"/>
+          <a:stretch>
+            <a:fillRect/>
+          </a:stretch>
+        </p:blipFill>
+        <p:spPr>
+          <a:xfrm>
+            <a:off x="838199" y="1825625"/>
+            <a:ext cx="4326489" cy="4238745"/>
+          </a:xfrm>
+          <a:prstGeom prst="rect">
+            <a:avLst/>
+          </a:prstGeom>
+          <a:ln>
+            <a:solidFill>
+              <a:schemeClr val="tx1"/>
+            </a:solidFill>
+          </a:ln>
+        </p:spPr>
+      </p:pic>
+      <p:cxnSp>
+        <p:nvCxnSpPr>
+          <p:cNvPr id="4" name="Verbinder: gekrümmt 3">
+            <a:extLst>
+              <a:ext uri="{FF2B5EF4-FFF2-40B4-BE49-F238E27FC236}">
+                <a16:creationId xmlns:a16="http://schemas.microsoft.com/office/drawing/2014/main" id="{28837C48-F214-DA62-CEA2-044D2437EC29}"/>
+              </a:ext>
+            </a:extLst>
+          </p:cNvPr>
+          <p:cNvCxnSpPr>
+            <a:cxnSpLocks/>
+            <a:stCxn id="10" idx="0"/>
+            <a:endCxn id="12" idx="0"/>
+          </p:cNvCxnSpPr>
+          <p:nvPr/>
+        </p:nvCxnSpPr>
+        <p:spPr>
+          <a:xfrm rot="5400000" flipH="1" flipV="1">
+            <a:off x="7883030" y="3130405"/>
+            <a:ext cx="12700" cy="2727914"/>
+          </a:xfrm>
+          <a:prstGeom prst="curvedConnector3">
+            <a:avLst>
+              <a:gd name="adj1" fmla="val 1800000"/>
+            </a:avLst>
+          </a:prstGeom>
+          <a:ln>
+            <a:tailEnd type="triangle"/>
+          </a:ln>
+        </p:spPr>
+        <p:style>
+          <a:lnRef idx="1">
+            <a:schemeClr val="accent1"/>
+          </a:lnRef>
+          <a:fillRef idx="0">
+            <a:schemeClr val="accent1"/>
+          </a:fillRef>
+          <a:effectRef idx="0">
+            <a:schemeClr val="accent1"/>
+          </a:effectRef>
+          <a:fontRef idx="minor">
+            <a:schemeClr val="tx1"/>
+          </a:fontRef>
+        </p:style>
+      </p:cxnSp>
+      <p:cxnSp>
+        <p:nvCxnSpPr>
+          <p:cNvPr id="11" name="Verbinder: gekrümmt 10">
+            <a:extLst>
+              <a:ext uri="{FF2B5EF4-FFF2-40B4-BE49-F238E27FC236}">
+                <a16:creationId xmlns:a16="http://schemas.microsoft.com/office/drawing/2014/main" id="{C8C8FB1E-C766-BBAB-0476-EA139E523262}"/>
+              </a:ext>
+            </a:extLst>
+          </p:cNvPr>
+          <p:cNvCxnSpPr>
+            <a:cxnSpLocks/>
+            <a:stCxn id="12" idx="4"/>
+            <a:endCxn id="10" idx="4"/>
+          </p:cNvCxnSpPr>
+          <p:nvPr/>
+        </p:nvCxnSpPr>
+        <p:spPr>
+          <a:xfrm rot="5400000">
+            <a:off x="7883030" y="3967167"/>
+            <a:ext cx="12700" cy="2727914"/>
+          </a:xfrm>
+          <a:prstGeom prst="curvedConnector3">
+            <a:avLst>
+              <a:gd name="adj1" fmla="val 1800000"/>
+            </a:avLst>
+          </a:prstGeom>
+          <a:ln>
+            <a:tailEnd type="triangle"/>
+          </a:ln>
+        </p:spPr>
+        <p:style>
+          <a:lnRef idx="1">
+            <a:schemeClr val="accent1"/>
+          </a:lnRef>
+          <a:fillRef idx="0">
+            <a:schemeClr val="accent1"/>
+          </a:fillRef>
+          <a:effectRef idx="0">
+            <a:schemeClr val="accent1"/>
+          </a:effectRef>
+          <a:fontRef idx="minor">
+            <a:schemeClr val="tx1"/>
+          </a:fontRef>
+        </p:style>
+      </p:cxnSp>
+      <p:sp>
+        <p:nvSpPr>
+          <p:cNvPr id="3" name="Textfeld 2">
+            <a:extLst>
+              <a:ext uri="{FF2B5EF4-FFF2-40B4-BE49-F238E27FC236}">
+                <a16:creationId xmlns:a16="http://schemas.microsoft.com/office/drawing/2014/main" id="{FFBC0257-268A-4AA3-A6A9-98E8C7096EA9}"/>
+              </a:ext>
+            </a:extLst>
+          </p:cNvPr>
+          <p:cNvSpPr txBox="1"/>
+          <p:nvPr/>
+        </p:nvSpPr>
+        <p:spPr>
+          <a:xfrm>
+            <a:off x="5235327" y="5555411"/>
+            <a:ext cx="5306152" cy="923330"/>
+          </a:xfrm>
+          <a:prstGeom prst="rect">
+            <a:avLst/>
+          </a:prstGeom>
+          <a:noFill/>
+        </p:spPr>
+        <p:txBody>
+          <a:bodyPr wrap="square" rtlCol="0">
+            <a:spAutoFit/>
+          </a:bodyPr>
+          <a:lstStyle/>
+          <a:p>
+            <a:pPr marL="285750" indent="-285750">
+              <a:buFont typeface="Wingdings" panose="05000000000000000000" pitchFamily="2" charset="2"/>
+              <a:buChar char="è"/>
+            </a:pPr>
+            <a:r>
+              <a:rPr lang="de-DE" dirty="0"/>
+              <a:t>Der resultierende Graph enthält einen Zyklus, also wird ein Deadlock vorhergesagt.</a:t>
+            </a:r>
+          </a:p>
+          <a:p>
+            <a:pPr marL="285750" indent="-285750">
+              <a:buFont typeface="Wingdings" panose="05000000000000000000" pitchFamily="2" charset="2"/>
+              <a:buChar char="è"/>
+            </a:pPr>
+            <a:r>
+              <a:rPr lang="de-DE" dirty="0" err="1"/>
+              <a:t>False</a:t>
+            </a:r>
+            <a:r>
+              <a:rPr lang="de-DE" dirty="0"/>
+              <a:t>-Positive, da alle Events im gleichen Trace</a:t>
+            </a:r>
+          </a:p>
+        </p:txBody>
+      </p:sp>
+    </p:spTree>
+    <p:extLst>
+      <p:ext uri="{BB962C8B-B14F-4D97-AF65-F5344CB8AC3E}">
+        <p14:creationId xmlns:p14="http://schemas.microsoft.com/office/powerpoint/2010/main" val="4015444166"/>
+      </p:ext>
+    </p:extLst>
+  </p:cSld>
+  <p:clrMapOvr>
+    <a:masterClrMapping/>
+  </p:clrMapOvr>
+</p:sld>
+</file>
+
+<file path=ppt/slides/slide18.xml><?xml version="1.0" encoding="utf-8"?>
+<p:sld xmlns:a="http://schemas.openxmlformats.org/drawingml/2006/main" xmlns:r="http://schemas.openxmlformats.org/officeDocument/2006/relationships" xmlns:p="http://schemas.openxmlformats.org/presentationml/2006/main">
+  <p:cSld>
+    <p:spTree>
+      <p:nvGrpSpPr>
+        <p:cNvPr id="1" name=""/>
+        <p:cNvGrpSpPr/>
+        <p:nvPr/>
+      </p:nvGrpSpPr>
+      <p:grpSpPr>
+        <a:xfrm>
+          <a:off x="0" y="0"/>
+          <a:ext cx="0" cy="0"/>
+          <a:chOff x="0" y="0"/>
+          <a:chExt cx="0" cy="0"/>
+        </a:xfrm>
+      </p:grpSpPr>
+      <p:sp>
+        <p:nvSpPr>
+          <p:cNvPr id="2" name="Titel 1">
+            <a:extLst>
+              <a:ext uri="{FF2B5EF4-FFF2-40B4-BE49-F238E27FC236}">
                 <a16:creationId xmlns:a16="http://schemas.microsoft.com/office/drawing/2014/main" id="{AB69F180-C15C-AB39-672B-E33F114F04B1}"/>
               </a:ext>
             </a:extLst>
@@ -3545,7 +6345,7 @@
 </p:sld>
 </file>
 
-<file path=ppt/slides/slide11.xml><?xml version="1.0" encoding="utf-8"?>
+<file path=ppt/slides/slide19.xml><?xml version="1.0" encoding="utf-8"?>
 <p:sld xmlns:a="http://schemas.openxmlformats.org/drawingml/2006/main" xmlns:r="http://schemas.openxmlformats.org/officeDocument/2006/relationships" xmlns:p="http://schemas.openxmlformats.org/presentationml/2006/main">
   <p:cSld>
     <p:spTree>
@@ -3662,7 +6462,7 @@
 </p:sld>
 </file>
 
-<file path=ppt/slides/slide12.xml><?xml version="1.0" encoding="utf-8"?>
+<file path=ppt/slides/slide2.xml><?xml version="1.0" encoding="utf-8"?>
 <p:sld xmlns:a="http://schemas.openxmlformats.org/drawingml/2006/main" xmlns:r="http://schemas.openxmlformats.org/officeDocument/2006/relationships" xmlns:p="http://schemas.openxmlformats.org/presentationml/2006/main">
   <p:cSld>
     <p:spTree>
@@ -3684,6 +6484,120 @@
           <p:cNvPr id="2" name="Titel 1">
             <a:extLst>
               <a:ext uri="{FF2B5EF4-FFF2-40B4-BE49-F238E27FC236}">
+                <a16:creationId xmlns:a16="http://schemas.microsoft.com/office/drawing/2014/main" id="{FBF578F3-0649-E7DE-75C0-553982EE0D12}"/>
+              </a:ext>
+            </a:extLst>
+          </p:cNvPr>
+          <p:cNvSpPr>
+            <a:spLocks noGrp="1"/>
+          </p:cNvSpPr>
+          <p:nvPr>
+            <p:ph type="title"/>
+          </p:nvPr>
+        </p:nvSpPr>
+        <p:spPr/>
+        <p:txBody>
+          <a:bodyPr/>
+          <a:lstStyle/>
+          <a:p>
+            <a:r>
+              <a:rPr lang="de-DE" dirty="0"/>
+              <a:t>Agenda</a:t>
+            </a:r>
+          </a:p>
+        </p:txBody>
+      </p:sp>
+      <p:sp>
+        <p:nvSpPr>
+          <p:cNvPr id="3" name="Inhaltsplatzhalter 2">
+            <a:extLst>
+              <a:ext uri="{FF2B5EF4-FFF2-40B4-BE49-F238E27FC236}">
+                <a16:creationId xmlns:a16="http://schemas.microsoft.com/office/drawing/2014/main" id="{B428C1D7-3728-237F-4120-9777EB5948AE}"/>
+              </a:ext>
+            </a:extLst>
+          </p:cNvPr>
+          <p:cNvSpPr>
+            <a:spLocks noGrp="1"/>
+          </p:cNvSpPr>
+          <p:nvPr>
+            <p:ph idx="1"/>
+          </p:nvPr>
+        </p:nvSpPr>
+        <p:spPr/>
+        <p:txBody>
+          <a:bodyPr/>
+          <a:lstStyle/>
+          <a:p>
+            <a:r>
+              <a:rPr lang="de-DE" dirty="0"/>
+              <a:t>Einleitung</a:t>
+            </a:r>
+          </a:p>
+          <a:p>
+            <a:r>
+              <a:rPr lang="de-DE" dirty="0"/>
+              <a:t>Die Vorhersage von Deadlocks</a:t>
+            </a:r>
+          </a:p>
+          <a:p>
+            <a:r>
+              <a:rPr lang="de-DE" dirty="0"/>
+              <a:t>Dynamische Deadlock-Analyse</a:t>
+            </a:r>
+          </a:p>
+          <a:p>
+            <a:r>
+              <a:rPr lang="de-DE" dirty="0" err="1"/>
+              <a:t>Sync-preserving</a:t>
+            </a:r>
+            <a:r>
+              <a:rPr lang="de-DE" dirty="0"/>
+              <a:t> Deadlocks</a:t>
+            </a:r>
+          </a:p>
+          <a:p>
+            <a:r>
+              <a:rPr lang="de-DE" dirty="0"/>
+              <a:t>Fazit</a:t>
+            </a:r>
+          </a:p>
+        </p:txBody>
+      </p:sp>
+    </p:spTree>
+    <p:extLst>
+      <p:ext uri="{BB962C8B-B14F-4D97-AF65-F5344CB8AC3E}">
+        <p14:creationId xmlns:p14="http://schemas.microsoft.com/office/powerpoint/2010/main" val="3999056049"/>
+      </p:ext>
+    </p:extLst>
+  </p:cSld>
+  <p:clrMapOvr>
+    <a:masterClrMapping/>
+  </p:clrMapOvr>
+</p:sld>
+</file>
+
+<file path=ppt/slides/slide20.xml><?xml version="1.0" encoding="utf-8"?>
+<p:sld xmlns:a="http://schemas.openxmlformats.org/drawingml/2006/main" xmlns:r="http://schemas.openxmlformats.org/officeDocument/2006/relationships" xmlns:p="http://schemas.openxmlformats.org/presentationml/2006/main">
+  <p:cSld>
+    <p:spTree>
+      <p:nvGrpSpPr>
+        <p:cNvPr id="1" name=""/>
+        <p:cNvGrpSpPr/>
+        <p:nvPr/>
+      </p:nvGrpSpPr>
+      <p:grpSpPr>
+        <a:xfrm>
+          <a:off x="0" y="0"/>
+          <a:ext cx="0" cy="0"/>
+          <a:chOff x="0" y="0"/>
+          <a:chExt cx="0" cy="0"/>
+        </a:xfrm>
+      </p:grpSpPr>
+      <p:sp>
+        <p:nvSpPr>
+          <p:cNvPr id="2" name="Titel 1">
+            <a:extLst>
+              <a:ext uri="{FF2B5EF4-FFF2-40B4-BE49-F238E27FC236}">
                 <a16:creationId xmlns:a16="http://schemas.microsoft.com/office/drawing/2014/main" id="{6B6F4EFA-ED7B-7D39-FA9A-C0FF07B98202}"/>
               </a:ext>
             </a:extLst>
@@ -3808,7 +6722,7 @@
 </p:sld>
 </file>
 
-<file path=ppt/slides/slide13.xml><?xml version="1.0" encoding="utf-8"?>
+<file path=ppt/slides/slide21.xml><?xml version="1.0" encoding="utf-8"?>
 <p:sld xmlns:a="http://schemas.openxmlformats.org/drawingml/2006/main" xmlns:r="http://schemas.openxmlformats.org/officeDocument/2006/relationships" xmlns:p="http://schemas.openxmlformats.org/presentationml/2006/main">
   <p:cSld>
     <p:spTree>
@@ -3939,7 +6853,7 @@
 </p:sld>
 </file>
 
-<file path=ppt/slides/slide14.xml><?xml version="1.0" encoding="utf-8"?>
+<file path=ppt/slides/slide22.xml><?xml version="1.0" encoding="utf-8"?>
 <p:sld xmlns:a="http://schemas.openxmlformats.org/drawingml/2006/main" xmlns:r="http://schemas.openxmlformats.org/officeDocument/2006/relationships" xmlns:p="http://schemas.openxmlformats.org/presentationml/2006/main">
   <p:cSld>
     <p:spTree>
@@ -4035,7 +6949,7 @@
 </p:sld>
 </file>
 
-<file path=ppt/slides/slide15.xml><?xml version="1.0" encoding="utf-8"?>
+<file path=ppt/slides/slide23.xml><?xml version="1.0" encoding="utf-8"?>
 <p:sld xmlns:a="http://schemas.openxmlformats.org/drawingml/2006/main" xmlns:r="http://schemas.openxmlformats.org/officeDocument/2006/relationships" xmlns:p="http://schemas.openxmlformats.org/presentationml/2006/main">
   <p:cSld>
     <p:spTree>
@@ -4215,7 +7129,7 @@
 </p:sld>
 </file>
 
-<file path=ppt/slides/slide16.xml><?xml version="1.0" encoding="utf-8"?>
+<file path=ppt/slides/slide24.xml><?xml version="1.0" encoding="utf-8"?>
 <p:sld xmlns:a="http://schemas.openxmlformats.org/drawingml/2006/main" xmlns:r="http://schemas.openxmlformats.org/officeDocument/2006/relationships" xmlns:p="http://schemas.openxmlformats.org/presentationml/2006/main">
   <p:cSld>
     <p:spTree>
@@ -4337,7 +7251,7 @@
 </p:sld>
 </file>
 
-<file path=ppt/slides/slide17.xml><?xml version="1.0" encoding="utf-8"?>
+<file path=ppt/slides/slide25.xml><?xml version="1.0" encoding="utf-8"?>
 <p:sld xmlns:a="http://schemas.openxmlformats.org/drawingml/2006/main" xmlns:r="http://schemas.openxmlformats.org/officeDocument/2006/relationships" xmlns:p="http://schemas.openxmlformats.org/presentationml/2006/main">
   <p:cSld>
     <p:spTree>
@@ -4480,7 +7394,7 @@
 </p:sld>
 </file>
 
-<file path=ppt/slides/slide18.xml><?xml version="1.0" encoding="utf-8"?>
+<file path=ppt/slides/slide26.xml><?xml version="1.0" encoding="utf-8"?>
 <p:sld xmlns:a="http://schemas.openxmlformats.org/drawingml/2006/main" xmlns:r="http://schemas.openxmlformats.org/officeDocument/2006/relationships" xmlns:p="http://schemas.openxmlformats.org/presentationml/2006/main">
   <p:cSld>
     <p:spTree>
@@ -4656,7 +7570,7 @@
 </p:sld>
 </file>
 
-<file path=ppt/slides/slide19.xml><?xml version="1.0" encoding="utf-8"?>
+<file path=ppt/slides/slide27.xml><?xml version="1.0" encoding="utf-8"?>
 <p:sld xmlns:a="http://schemas.openxmlformats.org/drawingml/2006/main" xmlns:r="http://schemas.openxmlformats.org/officeDocument/2006/relationships" xmlns:p="http://schemas.openxmlformats.org/presentationml/2006/main">
   <p:cSld>
     <p:spTree>
@@ -4752,121 +7666,7 @@
 </p:sld>
 </file>
 
-<file path=ppt/slides/slide2.xml><?xml version="1.0" encoding="utf-8"?>
-<p:sld xmlns:a="http://schemas.openxmlformats.org/drawingml/2006/main" xmlns:r="http://schemas.openxmlformats.org/officeDocument/2006/relationships" xmlns:p="http://schemas.openxmlformats.org/presentationml/2006/main">
-  <p:cSld>
-    <p:spTree>
-      <p:nvGrpSpPr>
-        <p:cNvPr id="1" name=""/>
-        <p:cNvGrpSpPr/>
-        <p:nvPr/>
-      </p:nvGrpSpPr>
-      <p:grpSpPr>
-        <a:xfrm>
-          <a:off x="0" y="0"/>
-          <a:ext cx="0" cy="0"/>
-          <a:chOff x="0" y="0"/>
-          <a:chExt cx="0" cy="0"/>
-        </a:xfrm>
-      </p:grpSpPr>
-      <p:sp>
-        <p:nvSpPr>
-          <p:cNvPr id="2" name="Titel 1">
-            <a:extLst>
-              <a:ext uri="{FF2B5EF4-FFF2-40B4-BE49-F238E27FC236}">
-                <a16:creationId xmlns:a16="http://schemas.microsoft.com/office/drawing/2014/main" id="{FBF578F3-0649-E7DE-75C0-553982EE0D12}"/>
-              </a:ext>
-            </a:extLst>
-          </p:cNvPr>
-          <p:cNvSpPr>
-            <a:spLocks noGrp="1"/>
-          </p:cNvSpPr>
-          <p:nvPr>
-            <p:ph type="title"/>
-          </p:nvPr>
-        </p:nvSpPr>
-        <p:spPr/>
-        <p:txBody>
-          <a:bodyPr/>
-          <a:lstStyle/>
-          <a:p>
-            <a:r>
-              <a:rPr lang="de-DE" dirty="0"/>
-              <a:t>Agenda</a:t>
-            </a:r>
-          </a:p>
-        </p:txBody>
-      </p:sp>
-      <p:sp>
-        <p:nvSpPr>
-          <p:cNvPr id="3" name="Inhaltsplatzhalter 2">
-            <a:extLst>
-              <a:ext uri="{FF2B5EF4-FFF2-40B4-BE49-F238E27FC236}">
-                <a16:creationId xmlns:a16="http://schemas.microsoft.com/office/drawing/2014/main" id="{B428C1D7-3728-237F-4120-9777EB5948AE}"/>
-              </a:ext>
-            </a:extLst>
-          </p:cNvPr>
-          <p:cNvSpPr>
-            <a:spLocks noGrp="1"/>
-          </p:cNvSpPr>
-          <p:nvPr>
-            <p:ph idx="1"/>
-          </p:nvPr>
-        </p:nvSpPr>
-        <p:spPr/>
-        <p:txBody>
-          <a:bodyPr/>
-          <a:lstStyle/>
-          <a:p>
-            <a:r>
-              <a:rPr lang="de-DE" dirty="0"/>
-              <a:t>Einleitung</a:t>
-            </a:r>
-          </a:p>
-          <a:p>
-            <a:r>
-              <a:rPr lang="de-DE" dirty="0"/>
-              <a:t>Die Vorhersage von Deadlocks</a:t>
-            </a:r>
-          </a:p>
-          <a:p>
-            <a:r>
-              <a:rPr lang="de-DE" dirty="0"/>
-              <a:t>Dynamische Deadlock-Analyse</a:t>
-            </a:r>
-          </a:p>
-          <a:p>
-            <a:r>
-              <a:rPr lang="de-DE" dirty="0" err="1"/>
-              <a:t>Sync-preserving</a:t>
-            </a:r>
-            <a:r>
-              <a:rPr lang="de-DE" dirty="0"/>
-              <a:t> Deadlocks</a:t>
-            </a:r>
-          </a:p>
-          <a:p>
-            <a:r>
-              <a:rPr lang="de-DE" dirty="0"/>
-              <a:t>Fazit</a:t>
-            </a:r>
-          </a:p>
-        </p:txBody>
-      </p:sp>
-    </p:spTree>
-    <p:extLst>
-      <p:ext uri="{BB962C8B-B14F-4D97-AF65-F5344CB8AC3E}">
-        <p14:creationId xmlns:p14="http://schemas.microsoft.com/office/powerpoint/2010/main" val="3999056049"/>
-      </p:ext>
-    </p:extLst>
-  </p:cSld>
-  <p:clrMapOvr>
-    <a:masterClrMapping/>
-  </p:clrMapOvr>
-</p:sld>
-</file>
-
-<file path=ppt/slides/slide20.xml><?xml version="1.0" encoding="utf-8"?>
+<file path=ppt/slides/slide28.xml><?xml version="1.0" encoding="utf-8"?>
 <p:sld xmlns:a="http://schemas.openxmlformats.org/drawingml/2006/main" xmlns:r="http://schemas.openxmlformats.org/officeDocument/2006/relationships" xmlns:p="http://schemas.openxmlformats.org/presentationml/2006/main">
   <p:cSld>
     <p:spTree>
@@ -5100,7 +7900,7 @@
 </p:sld>
 </file>
 
-<file path=ppt/slides/slide21.xml><?xml version="1.0" encoding="utf-8"?>
+<file path=ppt/slides/slide29.xml><?xml version="1.0" encoding="utf-8"?>
 <p:sld xmlns:a="http://schemas.openxmlformats.org/drawingml/2006/main" xmlns:r="http://schemas.openxmlformats.org/officeDocument/2006/relationships" xmlns:p="http://schemas.openxmlformats.org/presentationml/2006/main">
   <p:cSld>
     <p:spTree>
@@ -5407,36 +8207,6 @@
           </a:p>
         </p:txBody>
       </p:sp>
-      <p:pic>
-        <p:nvPicPr>
-          <p:cNvPr id="11" name="Grafik 10">
-            <a:extLst>
-              <a:ext uri="{FF2B5EF4-FFF2-40B4-BE49-F238E27FC236}">
-                <a16:creationId xmlns:a16="http://schemas.microsoft.com/office/drawing/2014/main" id="{8907934D-CF61-B88D-9E7E-58D685CB637D}"/>
-              </a:ext>
-            </a:extLst>
-          </p:cNvPr>
-          <p:cNvPicPr>
-            <a:picLocks noChangeAspect="1"/>
-          </p:cNvPicPr>
-          <p:nvPr/>
-        </p:nvPicPr>
-        <p:blipFill>
-          <a:blip r:embed="rId2"/>
-          <a:stretch>
-            <a:fillRect/>
-          </a:stretch>
-        </p:blipFill>
-        <p:spPr>
-          <a:xfrm>
-            <a:off x="8422132" y="1080760"/>
-            <a:ext cx="3077004" cy="4696480"/>
-          </a:xfrm>
-          <a:prstGeom prst="rect">
-            <a:avLst/>
-          </a:prstGeom>
-        </p:spPr>
-      </p:pic>
     </p:spTree>
     <p:extLst>
       <p:ext uri="{BB962C8B-B14F-4D97-AF65-F5344CB8AC3E}">
@@ -5472,7 +8242,7 @@
           <p:cNvPr id="2" name="Titel 1">
             <a:extLst>
               <a:ext uri="{FF2B5EF4-FFF2-40B4-BE49-F238E27FC236}">
-                <a16:creationId xmlns:a16="http://schemas.microsoft.com/office/drawing/2014/main" id="{178C909C-BDC1-4FA3-AD6F-7AB8D5214EE0}"/>
+                <a16:creationId xmlns:a16="http://schemas.microsoft.com/office/drawing/2014/main" id="{F20DC790-1C26-D1D2-4648-02B84DB2C381}"/>
               </a:ext>
             </a:extLst>
           </p:cNvPr>
@@ -5490,7 +8260,7 @@
           <a:p>
             <a:r>
               <a:rPr lang="de-DE" dirty="0"/>
-              <a:t>Die Vorhersage von Deadlocks</a:t>
+              <a:t>Einleitung</a:t>
             </a:r>
           </a:p>
         </p:txBody>
@@ -5500,7 +8270,7 @@
           <p:cNvPr id="3" name="Inhaltsplatzhalter 2">
             <a:extLst>
               <a:ext uri="{FF2B5EF4-FFF2-40B4-BE49-F238E27FC236}">
-                <a16:creationId xmlns:a16="http://schemas.microsoft.com/office/drawing/2014/main" id="{077E50AF-D281-F901-C679-35A5DF63CE23}"/>
+                <a16:creationId xmlns:a16="http://schemas.microsoft.com/office/drawing/2014/main" id="{AFD97513-F99F-7ADB-1B18-C03948B63DA4}"/>
               </a:ext>
             </a:extLst>
           </p:cNvPr>
@@ -5518,21 +8288,78 @@
           <a:p>
             <a:r>
               <a:rPr lang="de-DE" dirty="0"/>
-              <a:t>Deadlocks müssen vorhergesagt werden, um Programmabstürze zu verhindern</a:t>
-            </a:r>
-          </a:p>
-          <a:p>
-            <a:r>
-              <a:rPr lang="de-DE" dirty="0"/>
-              <a:t>Verschiedene Ansätze statische und dynamische Deadlock-Analyse</a:t>
-            </a:r>
-          </a:p>
-        </p:txBody>
-      </p:sp>
+              <a:t>Programm enthält Deadlock</a:t>
+            </a:r>
+          </a:p>
+          <a:p>
+            <a:r>
+              <a:rPr lang="de-DE" dirty="0"/>
+              <a:t>Tritt auf wenn beide Threads den jeweils ersten</a:t>
+            </a:r>
+          </a:p>
+          <a:p>
+            <a:pPr marL="0" indent="0">
+              <a:buNone/>
+            </a:pPr>
+            <a:r>
+              <a:rPr lang="de-DE" dirty="0"/>
+              <a:t>   Mutex locken</a:t>
+            </a:r>
+          </a:p>
+          <a:p>
+            <a:r>
+              <a:rPr lang="de-DE" dirty="0"/>
+              <a:t>Der jeweils zweite Lock kann nicht reserviert </a:t>
+            </a:r>
+          </a:p>
+          <a:p>
+            <a:pPr marL="0" indent="0">
+              <a:buNone/>
+            </a:pPr>
+            <a:r>
+              <a:rPr lang="de-DE" dirty="0"/>
+              <a:t>   werden, da er bereits belegt ist</a:t>
+            </a:r>
+          </a:p>
+          <a:p>
+            <a:endParaRPr lang="de-DE" dirty="0"/>
+          </a:p>
+        </p:txBody>
+      </p:sp>
+      <p:pic>
+        <p:nvPicPr>
+          <p:cNvPr id="4" name="Grafik 3">
+            <a:extLst>
+              <a:ext uri="{FF2B5EF4-FFF2-40B4-BE49-F238E27FC236}">
+                <a16:creationId xmlns:a16="http://schemas.microsoft.com/office/drawing/2014/main" id="{E47137E7-F73A-B134-A48D-7B84AB3951C4}"/>
+              </a:ext>
+            </a:extLst>
+          </p:cNvPr>
+          <p:cNvPicPr>
+            <a:picLocks noChangeAspect="1"/>
+          </p:cNvPicPr>
+          <p:nvPr/>
+        </p:nvPicPr>
+        <p:blipFill>
+          <a:blip r:embed="rId2"/>
+          <a:stretch>
+            <a:fillRect/>
+          </a:stretch>
+        </p:blipFill>
+        <p:spPr>
+          <a:xfrm>
+            <a:off x="8070401" y="582876"/>
+            <a:ext cx="3835273" cy="5956614"/>
+          </a:xfrm>
+          <a:prstGeom prst="rect">
+            <a:avLst/>
+          </a:prstGeom>
+        </p:spPr>
+      </p:pic>
     </p:spTree>
     <p:extLst>
       <p:ext uri="{BB962C8B-B14F-4D97-AF65-F5344CB8AC3E}">
-        <p14:creationId xmlns:p14="http://schemas.microsoft.com/office/powerpoint/2010/main" val="3235281061"/>
+        <p14:creationId xmlns:p14="http://schemas.microsoft.com/office/powerpoint/2010/main" val="2547473671"/>
       </p:ext>
     </p:extLst>
   </p:cSld>
@@ -5564,7 +8391,7 @@
           <p:cNvPr id="2" name="Titel 1">
             <a:extLst>
               <a:ext uri="{FF2B5EF4-FFF2-40B4-BE49-F238E27FC236}">
-                <a16:creationId xmlns:a16="http://schemas.microsoft.com/office/drawing/2014/main" id="{CAC9EE98-6811-1262-89B6-8BCD2C57B3C6}"/>
+                <a16:creationId xmlns:a16="http://schemas.microsoft.com/office/drawing/2014/main" id="{178C909C-BDC1-4FA3-AD6F-7AB8D5214EE0}"/>
               </a:ext>
             </a:extLst>
           </p:cNvPr>
@@ -5592,7 +8419,7 @@
           <p:cNvPr id="3" name="Inhaltsplatzhalter 2">
             <a:extLst>
               <a:ext uri="{FF2B5EF4-FFF2-40B4-BE49-F238E27FC236}">
-                <a16:creationId xmlns:a16="http://schemas.microsoft.com/office/drawing/2014/main" id="{1CBE0742-08CB-87F8-71F9-F6224A1F435F}"/>
+                <a16:creationId xmlns:a16="http://schemas.microsoft.com/office/drawing/2014/main" id="{077E50AF-D281-F901-C679-35A5DF63CE23}"/>
               </a:ext>
             </a:extLst>
           </p:cNvPr>
@@ -5610,14 +8437,27 @@
           <a:p>
             <a:r>
               <a:rPr lang="de-DE" dirty="0"/>
-              <a:t>Statische Deadlock-Analyse</a:t>
+              <a:t>Deadlocks müssen vorhergesagt werden, ansonsten können Threads stecken bleiben</a:t>
+            </a:r>
+          </a:p>
+          <a:p>
+            <a:r>
+              <a:rPr lang="de-DE" dirty="0"/>
+              <a:t>Dynamische Deadlock-Analyse </a:t>
             </a:r>
           </a:p>
           <a:p>
             <a:pPr lvl="1"/>
             <a:r>
               <a:rPr lang="de-DE" dirty="0"/>
-              <a:t>kann Abwesenheit von Deadlocks beweisen, aber nicht gut skalierbar und liefert </a:t>
+              <a:t>Effizient</a:t>
+            </a:r>
+          </a:p>
+          <a:p>
+            <a:pPr lvl="1"/>
+            <a:r>
+              <a:rPr lang="de-DE" dirty="0"/>
+              <a:t>Liefert wenige oder keine </a:t>
             </a:r>
             <a:r>
               <a:rPr lang="de-DE" dirty="0" err="1"/>
@@ -5625,46 +8465,15 @@
             </a:r>
             <a:r>
               <a:rPr lang="de-DE" dirty="0"/>
-              <a:t> Positives</a:t>
-            </a:r>
-          </a:p>
-          <a:p>
-            <a:r>
-              <a:rPr lang="de-DE" dirty="0"/>
-              <a:t>Dynamische Deadlock-Analyse </a:t>
-            </a:r>
-          </a:p>
-          <a:p>
-            <a:pPr lvl="1"/>
-            <a:r>
-              <a:rPr lang="de-DE" dirty="0"/>
-              <a:t>Effizienter</a:t>
-            </a:r>
-          </a:p>
-          <a:p>
-            <a:pPr lvl="1"/>
-            <a:r>
-              <a:rPr lang="de-DE" dirty="0"/>
-              <a:t>Liefert wenige oder keine </a:t>
-            </a:r>
-            <a:r>
-              <a:rPr lang="de-DE" dirty="0" err="1"/>
-              <a:t>False</a:t>
-            </a:r>
-            <a:r>
-              <a:rPr lang="de-DE" dirty="0"/>
               <a:t>-Positives</a:t>
             </a:r>
-          </a:p>
-          <a:p>
-            <a:endParaRPr lang="de-DE" dirty="0"/>
           </a:p>
         </p:txBody>
       </p:sp>
     </p:spTree>
     <p:extLst>
       <p:ext uri="{BB962C8B-B14F-4D97-AF65-F5344CB8AC3E}">
-        <p14:creationId xmlns:p14="http://schemas.microsoft.com/office/powerpoint/2010/main" val="3168630278"/>
+        <p14:creationId xmlns:p14="http://schemas.microsoft.com/office/powerpoint/2010/main" val="3235281061"/>
       </p:ext>
     </p:extLst>
   </p:cSld>
@@ -5696,7 +8505,7 @@
           <p:cNvPr id="2" name="Titel 1">
             <a:extLst>
               <a:ext uri="{FF2B5EF4-FFF2-40B4-BE49-F238E27FC236}">
-                <a16:creationId xmlns:a16="http://schemas.microsoft.com/office/drawing/2014/main" id="{661FD3D5-05E5-BB98-FE98-EAB9EA7B8B07}"/>
+                <a16:creationId xmlns:a16="http://schemas.microsoft.com/office/drawing/2014/main" id="{D2AB59FB-FC2D-88A8-3917-1BD66A551A60}"/>
               </a:ext>
             </a:extLst>
           </p:cNvPr>
@@ -5724,7 +8533,7 @@
           <p:cNvPr id="3" name="Inhaltsplatzhalter 2">
             <a:extLst>
               <a:ext uri="{FF2B5EF4-FFF2-40B4-BE49-F238E27FC236}">
-                <a16:creationId xmlns:a16="http://schemas.microsoft.com/office/drawing/2014/main" id="{11DDA806-7FAD-3E05-A00B-FDDC143FC964}"/>
+                <a16:creationId xmlns:a16="http://schemas.microsoft.com/office/drawing/2014/main" id="{56B6E1BC-7776-5940-5E3D-AEAA6882DD3C}"/>
               </a:ext>
             </a:extLst>
           </p:cNvPr>
@@ -5740,79 +8549,59 @@
           <a:bodyPr/>
           <a:lstStyle/>
           <a:p>
-            <a:endParaRPr lang="de-DE" dirty="0"/>
-          </a:p>
-        </p:txBody>
-      </p:sp>
-      <p:pic>
-        <p:nvPicPr>
-          <p:cNvPr id="7" name="Grafik 6">
-            <a:extLst>
-              <a:ext uri="{FF2B5EF4-FFF2-40B4-BE49-F238E27FC236}">
-                <a16:creationId xmlns:a16="http://schemas.microsoft.com/office/drawing/2014/main" id="{94018E8F-24AE-2186-5097-F867FBCC1118}"/>
-              </a:ext>
-            </a:extLst>
-          </p:cNvPr>
-          <p:cNvPicPr>
-            <a:picLocks noChangeAspect="1"/>
-          </p:cNvPicPr>
-          <p:nvPr/>
-        </p:nvPicPr>
-        <p:blipFill>
-          <a:blip r:embed="rId2"/>
-          <a:stretch>
-            <a:fillRect/>
-          </a:stretch>
-        </p:blipFill>
-        <p:spPr>
-          <a:xfrm>
-            <a:off x="5418372" y="1985378"/>
-            <a:ext cx="4429743" cy="4191585"/>
-          </a:xfrm>
-          <a:prstGeom prst="rect">
-            <a:avLst/>
-          </a:prstGeom>
-          <a:ln>
-            <a:solidFill>
-              <a:schemeClr val="tx1"/>
-            </a:solidFill>
-          </a:ln>
-        </p:spPr>
-      </p:pic>
-      <p:pic>
-        <p:nvPicPr>
-          <p:cNvPr id="11" name="Grafik 10">
-            <a:extLst>
-              <a:ext uri="{FF2B5EF4-FFF2-40B4-BE49-F238E27FC236}">
-                <a16:creationId xmlns:a16="http://schemas.microsoft.com/office/drawing/2014/main" id="{46C34EEE-E4A0-78B5-505B-89094C4E561B}"/>
-              </a:ext>
-            </a:extLst>
-          </p:cNvPr>
-          <p:cNvPicPr>
-            <a:picLocks noChangeAspect="1"/>
-          </p:cNvPicPr>
-          <p:nvPr/>
-        </p:nvPicPr>
-        <p:blipFill>
-          <a:blip r:embed="rId3"/>
-          <a:stretch>
-            <a:fillRect/>
-          </a:stretch>
-        </p:blipFill>
-        <p:spPr>
-          <a:xfrm>
-            <a:off x="1389425" y="1653054"/>
-            <a:ext cx="3077004" cy="4696480"/>
-          </a:xfrm>
-          <a:prstGeom prst="rect">
-            <a:avLst/>
-          </a:prstGeom>
-        </p:spPr>
-      </p:pic>
+            <a:r>
+              <a:rPr lang="de-DE" dirty="0"/>
+              <a:t>Grundlage: Trace</a:t>
+            </a:r>
+          </a:p>
+          <a:p>
+            <a:r>
+              <a:rPr lang="de-DE" dirty="0"/>
+              <a:t>Trace ist Aufzeichnung der abgelaufenen Operationen im Programm</a:t>
+            </a:r>
+          </a:p>
+          <a:p>
+            <a:r>
+              <a:rPr lang="de-DE" dirty="0"/>
+              <a:t>Dazu gehört: </a:t>
+            </a:r>
+            <a:r>
+              <a:rPr lang="de-DE" dirty="0" err="1"/>
+              <a:t>Acquire</a:t>
+            </a:r>
+            <a:r>
+              <a:rPr lang="de-DE" dirty="0"/>
+              <a:t>- und Release von Locks</a:t>
+            </a:r>
+          </a:p>
+          <a:p>
+            <a:r>
+              <a:rPr lang="de-DE" dirty="0"/>
+              <a:t>Je nach Methode auch Reads/</a:t>
+            </a:r>
+            <a:r>
+              <a:rPr lang="de-DE" dirty="0" err="1"/>
+              <a:t>Writes</a:t>
+            </a:r>
+            <a:r>
+              <a:rPr lang="de-DE" dirty="0"/>
+              <a:t> oder auch Forks/</a:t>
+            </a:r>
+            <a:r>
+              <a:rPr lang="de-DE" dirty="0" err="1"/>
+              <a:t>Joins</a:t>
+            </a:r>
+            <a:r>
+              <a:rPr lang="de-DE" dirty="0"/>
+              <a:t> relevant</a:t>
+            </a:r>
+          </a:p>
+        </p:txBody>
+      </p:sp>
     </p:spTree>
     <p:extLst>
       <p:ext uri="{BB962C8B-B14F-4D97-AF65-F5344CB8AC3E}">
-        <p14:creationId xmlns:p14="http://schemas.microsoft.com/office/powerpoint/2010/main" val="624210621"/>
+        <p14:creationId xmlns:p14="http://schemas.microsoft.com/office/powerpoint/2010/main" val="636686143"/>
       </p:ext>
     </p:extLst>
   </p:cSld>
@@ -5844,7 +8633,7 @@
           <p:cNvPr id="2" name="Titel 1">
             <a:extLst>
               <a:ext uri="{FF2B5EF4-FFF2-40B4-BE49-F238E27FC236}">
-                <a16:creationId xmlns:a16="http://schemas.microsoft.com/office/drawing/2014/main" id="{1F18901F-6FB0-C5BA-6E51-56EDB5C6E861}"/>
+                <a16:creationId xmlns:a16="http://schemas.microsoft.com/office/drawing/2014/main" id="{661FD3D5-05E5-BB98-FE98-EAB9EA7B8B07}"/>
               </a:ext>
             </a:extLst>
           </p:cNvPr>
@@ -5872,7 +8661,7 @@
           <p:cNvPr id="3" name="Inhaltsplatzhalter 2">
             <a:extLst>
               <a:ext uri="{FF2B5EF4-FFF2-40B4-BE49-F238E27FC236}">
-                <a16:creationId xmlns:a16="http://schemas.microsoft.com/office/drawing/2014/main" id="{D39CDA7A-83D3-1CA9-806E-0FCB9AB77DC3}"/>
+                <a16:creationId xmlns:a16="http://schemas.microsoft.com/office/drawing/2014/main" id="{11DDA806-7FAD-3E05-A00B-FDDC143FC964}"/>
               </a:ext>
             </a:extLst>
           </p:cNvPr>
@@ -5888,56 +8677,79 @@
           <a:bodyPr/>
           <a:lstStyle/>
           <a:p>
-            <a:r>
-              <a:rPr lang="de-DE" dirty="0"/>
-              <a:t>Lock-</a:t>
-            </a:r>
-            <a:r>
-              <a:rPr lang="de-DE" dirty="0" err="1"/>
-              <a:t>Dependency</a:t>
-            </a:r>
-            <a:r>
-              <a:rPr lang="de-DE" dirty="0"/>
-              <a:t>-Methode sehr einfache Analyse</a:t>
-            </a:r>
-          </a:p>
-          <a:p>
-            <a:r>
-              <a:rPr lang="de-DE" dirty="0"/>
-              <a:t>Aus </a:t>
-            </a:r>
-            <a:r>
-              <a:rPr lang="de-DE" dirty="0" err="1"/>
-              <a:t>Acquire</a:t>
-            </a:r>
-            <a:r>
-              <a:rPr lang="de-DE" dirty="0"/>
-              <a:t>- und </a:t>
-            </a:r>
-            <a:r>
-              <a:rPr lang="de-DE" dirty="0" err="1"/>
-              <a:t>Releaseoperationen</a:t>
-            </a:r>
-            <a:r>
-              <a:rPr lang="de-DE" dirty="0"/>
-              <a:t> wird Graph aufgestellt</a:t>
-            </a:r>
-          </a:p>
-          <a:p>
-            <a:r>
-              <a:rPr lang="de-DE" dirty="0"/>
-              <a:t>Deadlock wenn Kreis im Graph existiert</a:t>
-            </a:r>
-          </a:p>
-          <a:p>
             <a:endParaRPr lang="de-DE" dirty="0"/>
           </a:p>
         </p:txBody>
       </p:sp>
+      <p:pic>
+        <p:nvPicPr>
+          <p:cNvPr id="7" name="Grafik 6">
+            <a:extLst>
+              <a:ext uri="{FF2B5EF4-FFF2-40B4-BE49-F238E27FC236}">
+                <a16:creationId xmlns:a16="http://schemas.microsoft.com/office/drawing/2014/main" id="{94018E8F-24AE-2186-5097-F867FBCC1118}"/>
+              </a:ext>
+            </a:extLst>
+          </p:cNvPr>
+          <p:cNvPicPr>
+            <a:picLocks noChangeAspect="1"/>
+          </p:cNvPicPr>
+          <p:nvPr/>
+        </p:nvPicPr>
+        <p:blipFill>
+          <a:blip r:embed="rId2"/>
+          <a:stretch>
+            <a:fillRect/>
+          </a:stretch>
+        </p:blipFill>
+        <p:spPr>
+          <a:xfrm>
+            <a:off x="5944845" y="1622476"/>
+            <a:ext cx="5027955" cy="4757635"/>
+          </a:xfrm>
+          <a:prstGeom prst="rect">
+            <a:avLst/>
+          </a:prstGeom>
+          <a:ln>
+            <a:solidFill>
+              <a:schemeClr val="tx1"/>
+            </a:solidFill>
+          </a:ln>
+        </p:spPr>
+      </p:pic>
+      <p:pic>
+        <p:nvPicPr>
+          <p:cNvPr id="12" name="Grafik 11">
+            <a:extLst>
+              <a:ext uri="{FF2B5EF4-FFF2-40B4-BE49-F238E27FC236}">
+                <a16:creationId xmlns:a16="http://schemas.microsoft.com/office/drawing/2014/main" id="{A724943F-35B0-63C2-5145-BCB5E78BE500}"/>
+              </a:ext>
+            </a:extLst>
+          </p:cNvPr>
+          <p:cNvPicPr>
+            <a:picLocks noChangeAspect="1"/>
+          </p:cNvPicPr>
+          <p:nvPr/>
+        </p:nvPicPr>
+        <p:blipFill>
+          <a:blip r:embed="rId3"/>
+          <a:stretch>
+            <a:fillRect/>
+          </a:stretch>
+        </p:blipFill>
+        <p:spPr>
+          <a:xfrm>
+            <a:off x="838200" y="1358442"/>
+            <a:ext cx="3419764" cy="5311281"/>
+          </a:xfrm>
+          <a:prstGeom prst="rect">
+            <a:avLst/>
+          </a:prstGeom>
+        </p:spPr>
+      </p:pic>
     </p:spTree>
     <p:extLst>
       <p:ext uri="{BB962C8B-B14F-4D97-AF65-F5344CB8AC3E}">
-        <p14:creationId xmlns:p14="http://schemas.microsoft.com/office/powerpoint/2010/main" val="3991357525"/>
+        <p14:creationId xmlns:p14="http://schemas.microsoft.com/office/powerpoint/2010/main" val="624210621"/>
       </p:ext>
     </p:extLst>
   </p:cSld>
@@ -5969,7 +8781,7 @@
           <p:cNvPr id="2" name="Titel 1">
             <a:extLst>
               <a:ext uri="{FF2B5EF4-FFF2-40B4-BE49-F238E27FC236}">
-                <a16:creationId xmlns:a16="http://schemas.microsoft.com/office/drawing/2014/main" id="{661FD3D5-05E5-BB98-FE98-EAB9EA7B8B07}"/>
+                <a16:creationId xmlns:a16="http://schemas.microsoft.com/office/drawing/2014/main" id="{1F18901F-6FB0-C5BA-6E51-56EDB5C6E861}"/>
               </a:ext>
             </a:extLst>
           </p:cNvPr>
@@ -5992,79 +8804,97 @@
           </a:p>
         </p:txBody>
       </p:sp>
-      <p:pic>
-        <p:nvPicPr>
-          <p:cNvPr id="5" name="Inhaltsplatzhalter 4">
-            <a:extLst>
-              <a:ext uri="{FF2B5EF4-FFF2-40B4-BE49-F238E27FC236}">
-                <a16:creationId xmlns:a16="http://schemas.microsoft.com/office/drawing/2014/main" id="{63F10DDA-9391-5CC1-9A7D-869964359F9F}"/>
-              </a:ext>
-            </a:extLst>
-          </p:cNvPr>
-          <p:cNvPicPr>
-            <a:picLocks noGrp="1" noChangeAspect="1"/>
-          </p:cNvPicPr>
+      <p:sp>
+        <p:nvSpPr>
+          <p:cNvPr id="3" name="Inhaltsplatzhalter 2">
+            <a:extLst>
+              <a:ext uri="{FF2B5EF4-FFF2-40B4-BE49-F238E27FC236}">
+                <a16:creationId xmlns:a16="http://schemas.microsoft.com/office/drawing/2014/main" id="{D39CDA7A-83D3-1CA9-806E-0FCB9AB77DC3}"/>
+              </a:ext>
+            </a:extLst>
+          </p:cNvPr>
+          <p:cNvSpPr>
+            <a:spLocks noGrp="1"/>
+          </p:cNvSpPr>
           <p:nvPr>
             <p:ph idx="1"/>
           </p:nvPr>
-        </p:nvPicPr>
-        <p:blipFill>
-          <a:blip r:embed="rId2"/>
-          <a:stretch>
-            <a:fillRect/>
-          </a:stretch>
-        </p:blipFill>
-        <p:spPr>
-          <a:xfrm>
-            <a:off x="7140174" y="2599715"/>
-            <a:ext cx="3753374" cy="2095792"/>
-          </a:xfrm>
-          <a:ln>
-            <a:solidFill>
-              <a:schemeClr val="tx1"/>
-            </a:solidFill>
-          </a:ln>
-        </p:spPr>
-      </p:pic>
-      <p:pic>
-        <p:nvPicPr>
-          <p:cNvPr id="7" name="Grafik 6">
-            <a:extLst>
-              <a:ext uri="{FF2B5EF4-FFF2-40B4-BE49-F238E27FC236}">
-                <a16:creationId xmlns:a16="http://schemas.microsoft.com/office/drawing/2014/main" id="{94018E8F-24AE-2186-5097-F867FBCC1118}"/>
-              </a:ext>
-            </a:extLst>
-          </p:cNvPr>
-          <p:cNvPicPr>
-            <a:picLocks noChangeAspect="1"/>
-          </p:cNvPicPr>
-          <p:nvPr/>
-        </p:nvPicPr>
-        <p:blipFill>
-          <a:blip r:embed="rId3"/>
-          <a:stretch>
-            <a:fillRect/>
-          </a:stretch>
-        </p:blipFill>
-        <p:spPr>
-          <a:xfrm>
-            <a:off x="622085" y="1825625"/>
-            <a:ext cx="4429743" cy="4191585"/>
-          </a:xfrm>
-          <a:prstGeom prst="rect">
-            <a:avLst/>
-          </a:prstGeom>
-          <a:ln>
-            <a:solidFill>
-              <a:schemeClr val="tx1"/>
-            </a:solidFill>
-          </a:ln>
-        </p:spPr>
-      </p:pic>
+        </p:nvSpPr>
+        <p:spPr/>
+        <p:txBody>
+          <a:bodyPr/>
+          <a:lstStyle/>
+          <a:p>
+            <a:r>
+              <a:rPr lang="de-DE" dirty="0"/>
+              <a:t>Analyse durch Lock-Graphen sehr einfach</a:t>
+            </a:r>
+          </a:p>
+          <a:p>
+            <a:r>
+              <a:rPr lang="de-DE" dirty="0"/>
+              <a:t>Schritt 1: Erstelle Graph aus </a:t>
+            </a:r>
+            <a:r>
+              <a:rPr lang="de-DE" dirty="0" err="1"/>
+              <a:t>Acquire</a:t>
+            </a:r>
+            <a:r>
+              <a:rPr lang="de-DE" dirty="0"/>
+              <a:t>- und </a:t>
+            </a:r>
+            <a:r>
+              <a:rPr lang="de-DE" dirty="0" err="1"/>
+              <a:t>Releaseoperationen</a:t>
+            </a:r>
+            <a:r>
+              <a:rPr lang="de-DE" dirty="0"/>
+              <a:t>:</a:t>
+            </a:r>
+          </a:p>
+          <a:p>
+            <a:pPr lvl="1"/>
+            <a:r>
+              <a:rPr lang="de-DE" dirty="0"/>
+              <a:t>Locks sind Knoten</a:t>
+            </a:r>
+          </a:p>
+          <a:p>
+            <a:pPr lvl="1"/>
+            <a:r>
+              <a:rPr lang="de-DE" dirty="0"/>
+              <a:t>Kanten zwischen Knoten entstehen, wenn ein Thread einen Lock hält und den nächsten reservieren will</a:t>
+            </a:r>
+          </a:p>
+          <a:p>
+            <a:r>
+              <a:rPr lang="de-DE" dirty="0"/>
+              <a:t>Schritt 2:</a:t>
+            </a:r>
+          </a:p>
+          <a:p>
+            <a:pPr lvl="1"/>
+            <a:r>
+              <a:rPr lang="de-DE" dirty="0"/>
+              <a:t>Überprüfe den Graphen auf Zyklen</a:t>
+            </a:r>
+          </a:p>
+          <a:p>
+            <a:pPr lvl="1"/>
+            <a:r>
+              <a:rPr lang="de-DE" dirty="0"/>
+              <a:t>Sage Deadlock vorher, wenn Zyklus im Graph existiert</a:t>
+            </a:r>
+          </a:p>
+          <a:p>
+            <a:endParaRPr lang="de-DE" dirty="0"/>
+          </a:p>
+        </p:txBody>
+      </p:sp>
     </p:spTree>
     <p:extLst>
       <p:ext uri="{BB962C8B-B14F-4D97-AF65-F5344CB8AC3E}">
-        <p14:creationId xmlns:p14="http://schemas.microsoft.com/office/powerpoint/2010/main" val="3837331834"/>
+        <p14:creationId xmlns:p14="http://schemas.microsoft.com/office/powerpoint/2010/main" val="3991357525"/>
       </p:ext>
     </p:extLst>
   </p:cSld>

</xml_diff>